<commit_message>
Sem 8 First Presentation PPT Modification
</commit_message>
<xml_diff>
--- a/Document/PPT/Billy.pptx
+++ b/Document/PPT/Billy.pptx
@@ -281,7 +281,7 @@
           <a:p>
             <a:fld id="{33EDE7BA-5B6C-4896-A2E5-6A9DEAA77EB7}" type="datetimeFigureOut">
               <a:rPr lang="en-IN" smtClean="0"/>
-              <a:t>16-10-2022</a:t>
+              <a:t>29-01-2023</a:t>
             </a:fld>
             <a:endParaRPr lang="en-IN"/>
           </a:p>
@@ -451,7 +451,7 @@
           <a:p>
             <a:fld id="{33EDE7BA-5B6C-4896-A2E5-6A9DEAA77EB7}" type="datetimeFigureOut">
               <a:rPr lang="en-IN" smtClean="0"/>
-              <a:t>16-10-2022</a:t>
+              <a:t>29-01-2023</a:t>
             </a:fld>
             <a:endParaRPr lang="en-IN"/>
           </a:p>
@@ -631,7 +631,7 @@
           <a:p>
             <a:fld id="{33EDE7BA-5B6C-4896-A2E5-6A9DEAA77EB7}" type="datetimeFigureOut">
               <a:rPr lang="en-IN" smtClean="0"/>
-              <a:t>16-10-2022</a:t>
+              <a:t>29-01-2023</a:t>
             </a:fld>
             <a:endParaRPr lang="en-IN"/>
           </a:p>
@@ -801,7 +801,7 @@
           <a:p>
             <a:fld id="{33EDE7BA-5B6C-4896-A2E5-6A9DEAA77EB7}" type="datetimeFigureOut">
               <a:rPr lang="en-IN" smtClean="0"/>
-              <a:t>16-10-2022</a:t>
+              <a:t>29-01-2023</a:t>
             </a:fld>
             <a:endParaRPr lang="en-IN"/>
           </a:p>
@@ -1045,7 +1045,7 @@
           <a:p>
             <a:fld id="{33EDE7BA-5B6C-4896-A2E5-6A9DEAA77EB7}" type="datetimeFigureOut">
               <a:rPr lang="en-IN" smtClean="0"/>
-              <a:t>16-10-2022</a:t>
+              <a:t>29-01-2023</a:t>
             </a:fld>
             <a:endParaRPr lang="en-IN"/>
           </a:p>
@@ -1277,7 +1277,7 @@
           <a:p>
             <a:fld id="{33EDE7BA-5B6C-4896-A2E5-6A9DEAA77EB7}" type="datetimeFigureOut">
               <a:rPr lang="en-IN" smtClean="0"/>
-              <a:t>16-10-2022</a:t>
+              <a:t>29-01-2023</a:t>
             </a:fld>
             <a:endParaRPr lang="en-IN"/>
           </a:p>
@@ -1644,7 +1644,7 @@
           <a:p>
             <a:fld id="{33EDE7BA-5B6C-4896-A2E5-6A9DEAA77EB7}" type="datetimeFigureOut">
               <a:rPr lang="en-IN" smtClean="0"/>
-              <a:t>16-10-2022</a:t>
+              <a:t>29-01-2023</a:t>
             </a:fld>
             <a:endParaRPr lang="en-IN"/>
           </a:p>
@@ -1762,7 +1762,7 @@
           <a:p>
             <a:fld id="{33EDE7BA-5B6C-4896-A2E5-6A9DEAA77EB7}" type="datetimeFigureOut">
               <a:rPr lang="en-IN" smtClean="0"/>
-              <a:t>16-10-2022</a:t>
+              <a:t>29-01-2023</a:t>
             </a:fld>
             <a:endParaRPr lang="en-IN"/>
           </a:p>
@@ -1857,7 +1857,7 @@
           <a:p>
             <a:fld id="{33EDE7BA-5B6C-4896-A2E5-6A9DEAA77EB7}" type="datetimeFigureOut">
               <a:rPr lang="en-IN" smtClean="0"/>
-              <a:t>16-10-2022</a:t>
+              <a:t>29-01-2023</a:t>
             </a:fld>
             <a:endParaRPr lang="en-IN"/>
           </a:p>
@@ -2134,7 +2134,7 @@
           <a:p>
             <a:fld id="{33EDE7BA-5B6C-4896-A2E5-6A9DEAA77EB7}" type="datetimeFigureOut">
               <a:rPr lang="en-IN" smtClean="0"/>
-              <a:t>16-10-2022</a:t>
+              <a:t>29-01-2023</a:t>
             </a:fld>
             <a:endParaRPr lang="en-IN"/>
           </a:p>
@@ -2391,7 +2391,7 @@
           <a:p>
             <a:fld id="{33EDE7BA-5B6C-4896-A2E5-6A9DEAA77EB7}" type="datetimeFigureOut">
               <a:rPr lang="en-IN" smtClean="0"/>
-              <a:t>16-10-2022</a:t>
+              <a:t>29-01-2023</a:t>
             </a:fld>
             <a:endParaRPr lang="en-IN"/>
           </a:p>
@@ -2604,7 +2604,7 @@
           <a:p>
             <a:fld id="{33EDE7BA-5B6C-4896-A2E5-6A9DEAA77EB7}" type="datetimeFigureOut">
               <a:rPr lang="en-IN" smtClean="0"/>
-              <a:t>16-10-2022</a:t>
+              <a:t>29-01-2023</a:t>
             </a:fld>
             <a:endParaRPr lang="en-IN"/>
           </a:p>
@@ -3027,22 +3027,22 @@
         </p:nvSpPr>
         <p:spPr>
           <a:xfrm>
-            <a:off x="0" y="1564849"/>
-            <a:ext cx="9144000" cy="604837"/>
+            <a:off x="0" y="859999"/>
+            <a:ext cx="9144000" cy="1102151"/>
           </a:xfrm>
         </p:spPr>
         <p:txBody>
-          <a:bodyPr>
+          <a:bodyPr anchor="ctr">
             <a:normAutofit/>
           </a:bodyPr>
           <a:lstStyle/>
           <a:p>
             <a:r>
-              <a:rPr lang="en-IN" sz="3600" dirty="0">
-                <a:latin typeface="Times New Roman" panose="02020603050405020304" pitchFamily="18" charset="0"/>
-                <a:cs typeface="Times New Roman" panose="02020603050405020304" pitchFamily="18" charset="0"/>
-              </a:rPr>
-              <a:t>ONLINE FOOD ORDERING SYSTEM </a:t>
+              <a:rPr lang="en-IN" sz="4400" dirty="0">
+                <a:latin typeface="Times New Roman" panose="02020603050405020304" pitchFamily="18" charset="0"/>
+                <a:cs typeface="Times New Roman" panose="02020603050405020304" pitchFamily="18" charset="0"/>
+              </a:rPr>
+              <a:t>Billy</a:t>
             </a:r>
           </a:p>
         </p:txBody>
@@ -3065,8 +3065,8 @@
         </p:nvSpPr>
         <p:spPr>
           <a:xfrm>
-            <a:off x="0" y="2533455"/>
-            <a:ext cx="9144000" cy="3113202"/>
+            <a:off x="0" y="2419350"/>
+            <a:ext cx="9144000" cy="3771900"/>
           </a:xfrm>
         </p:spPr>
         <p:txBody>
@@ -3076,7 +3076,7 @@
           <a:lstStyle/>
           <a:p>
             <a:r>
-              <a:rPr lang="en-IN" sz="2000" dirty="0">
+              <a:rPr lang="en-IN" sz="2800" dirty="0">
                 <a:latin typeface="Times New Roman" panose="02020603050405020304" pitchFamily="18" charset="0"/>
                 <a:cs typeface="Times New Roman" panose="02020603050405020304" pitchFamily="18" charset="0"/>
               </a:rPr>
@@ -3084,14 +3084,14 @@
             </a:r>
           </a:p>
           <a:p>
-            <a:endParaRPr lang="en-IN" sz="2000" dirty="0">
+            <a:endParaRPr lang="en-IN" dirty="0">
               <a:latin typeface="Times New Roman" panose="02020603050405020304" pitchFamily="18" charset="0"/>
               <a:cs typeface="Times New Roman" panose="02020603050405020304" pitchFamily="18" charset="0"/>
             </a:endParaRPr>
           </a:p>
           <a:p>
             <a:r>
-              <a:rPr lang="en-IN" sz="2000" dirty="0">
+              <a:rPr lang="en-IN" dirty="0">
                 <a:latin typeface="Times New Roman" panose="02020603050405020304" pitchFamily="18" charset="0"/>
                 <a:cs typeface="Times New Roman" panose="02020603050405020304" pitchFamily="18" charset="0"/>
               </a:rPr>
@@ -3100,7 +3100,7 @@
           </a:p>
           <a:p>
             <a:r>
-              <a:rPr lang="en-IN" sz="2000" dirty="0">
+              <a:rPr lang="en-IN" dirty="0">
                 <a:latin typeface="Times New Roman" panose="02020603050405020304" pitchFamily="18" charset="0"/>
                 <a:cs typeface="Times New Roman" panose="02020603050405020304" pitchFamily="18" charset="0"/>
               </a:rPr>
@@ -3109,7 +3109,7 @@
           </a:p>
           <a:p>
             <a:r>
-              <a:rPr lang="en-IN" sz="2000" dirty="0">
+              <a:rPr lang="en-IN" dirty="0">
                 <a:latin typeface="Times New Roman" panose="02020603050405020304" pitchFamily="18" charset="0"/>
                 <a:cs typeface="Times New Roman" panose="02020603050405020304" pitchFamily="18" charset="0"/>
               </a:rPr>
@@ -3117,14 +3117,14 @@
             </a:r>
           </a:p>
           <a:p>
-            <a:endParaRPr lang="en-IN" sz="2000" dirty="0">
+            <a:endParaRPr lang="en-IN" dirty="0">
               <a:latin typeface="Times New Roman" panose="02020603050405020304" pitchFamily="18" charset="0"/>
               <a:cs typeface="Times New Roman" panose="02020603050405020304" pitchFamily="18" charset="0"/>
             </a:endParaRPr>
           </a:p>
           <a:p>
             <a:r>
-              <a:rPr lang="en-IN" sz="2000" dirty="0">
+              <a:rPr lang="en-IN" dirty="0">
                 <a:latin typeface="Times New Roman" panose="02020603050405020304" pitchFamily="18" charset="0"/>
                 <a:cs typeface="Times New Roman" panose="02020603050405020304" pitchFamily="18" charset="0"/>
               </a:rPr>
@@ -3133,7 +3133,7 @@
           </a:p>
           <a:p>
             <a:r>
-              <a:rPr lang="en-IN" sz="2000" dirty="0">
+              <a:rPr lang="en-IN" dirty="0">
                 <a:latin typeface="Times New Roman" panose="02020603050405020304" pitchFamily="18" charset="0"/>
                 <a:cs typeface="Times New Roman" panose="02020603050405020304" pitchFamily="18" charset="0"/>
               </a:rPr>

</xml_diff>

<commit_message>
Sem 8 External Presentation PPT
</commit_message>
<xml_diff>
--- a/Document/PPT/Billy.pptx
+++ b/Document/PPT/Billy.pptx
@@ -27,11 +27,12 @@
     <p:sldId id="274" r:id="rId21"/>
     <p:sldId id="353" r:id="rId22"/>
     <p:sldId id="365" r:id="rId23"/>
-    <p:sldId id="366" r:id="rId24"/>
-    <p:sldId id="367" r:id="rId25"/>
-    <p:sldId id="368" r:id="rId26"/>
-    <p:sldId id="292" r:id="rId27"/>
-    <p:sldId id="369" r:id="rId28"/>
+    <p:sldId id="370" r:id="rId24"/>
+    <p:sldId id="366" r:id="rId25"/>
+    <p:sldId id="367" r:id="rId26"/>
+    <p:sldId id="368" r:id="rId27"/>
+    <p:sldId id="292" r:id="rId28"/>
+    <p:sldId id="369" r:id="rId29"/>
   </p:sldIdLst>
   <p:sldSz cx="9144000" cy="6858000" type="screen4x3"/>
   <p:notesSz cx="6858000" cy="9144000"/>
@@ -281,7 +282,7 @@
           <a:p>
             <a:fld id="{33EDE7BA-5B6C-4896-A2E5-6A9DEAA77EB7}" type="datetimeFigureOut">
               <a:rPr lang="en-IN" smtClean="0"/>
-              <a:t>29-01-2023</a:t>
+              <a:t>28-04-2023</a:t>
             </a:fld>
             <a:endParaRPr lang="en-IN"/>
           </a:p>
@@ -451,7 +452,7 @@
           <a:p>
             <a:fld id="{33EDE7BA-5B6C-4896-A2E5-6A9DEAA77EB7}" type="datetimeFigureOut">
               <a:rPr lang="en-IN" smtClean="0"/>
-              <a:t>29-01-2023</a:t>
+              <a:t>28-04-2023</a:t>
             </a:fld>
             <a:endParaRPr lang="en-IN"/>
           </a:p>
@@ -631,7 +632,7 @@
           <a:p>
             <a:fld id="{33EDE7BA-5B6C-4896-A2E5-6A9DEAA77EB7}" type="datetimeFigureOut">
               <a:rPr lang="en-IN" smtClean="0"/>
-              <a:t>29-01-2023</a:t>
+              <a:t>28-04-2023</a:t>
             </a:fld>
             <a:endParaRPr lang="en-IN"/>
           </a:p>
@@ -801,7 +802,7 @@
           <a:p>
             <a:fld id="{33EDE7BA-5B6C-4896-A2E5-6A9DEAA77EB7}" type="datetimeFigureOut">
               <a:rPr lang="en-IN" smtClean="0"/>
-              <a:t>29-01-2023</a:t>
+              <a:t>28-04-2023</a:t>
             </a:fld>
             <a:endParaRPr lang="en-IN"/>
           </a:p>
@@ -1045,7 +1046,7 @@
           <a:p>
             <a:fld id="{33EDE7BA-5B6C-4896-A2E5-6A9DEAA77EB7}" type="datetimeFigureOut">
               <a:rPr lang="en-IN" smtClean="0"/>
-              <a:t>29-01-2023</a:t>
+              <a:t>28-04-2023</a:t>
             </a:fld>
             <a:endParaRPr lang="en-IN"/>
           </a:p>
@@ -1277,7 +1278,7 @@
           <a:p>
             <a:fld id="{33EDE7BA-5B6C-4896-A2E5-6A9DEAA77EB7}" type="datetimeFigureOut">
               <a:rPr lang="en-IN" smtClean="0"/>
-              <a:t>29-01-2023</a:t>
+              <a:t>28-04-2023</a:t>
             </a:fld>
             <a:endParaRPr lang="en-IN"/>
           </a:p>
@@ -1644,7 +1645,7 @@
           <a:p>
             <a:fld id="{33EDE7BA-5B6C-4896-A2E5-6A9DEAA77EB7}" type="datetimeFigureOut">
               <a:rPr lang="en-IN" smtClean="0"/>
-              <a:t>29-01-2023</a:t>
+              <a:t>28-04-2023</a:t>
             </a:fld>
             <a:endParaRPr lang="en-IN"/>
           </a:p>
@@ -1762,7 +1763,7 @@
           <a:p>
             <a:fld id="{33EDE7BA-5B6C-4896-A2E5-6A9DEAA77EB7}" type="datetimeFigureOut">
               <a:rPr lang="en-IN" smtClean="0"/>
-              <a:t>29-01-2023</a:t>
+              <a:t>28-04-2023</a:t>
             </a:fld>
             <a:endParaRPr lang="en-IN"/>
           </a:p>
@@ -1857,7 +1858,7 @@
           <a:p>
             <a:fld id="{33EDE7BA-5B6C-4896-A2E5-6A9DEAA77EB7}" type="datetimeFigureOut">
               <a:rPr lang="en-IN" smtClean="0"/>
-              <a:t>29-01-2023</a:t>
+              <a:t>28-04-2023</a:t>
             </a:fld>
             <a:endParaRPr lang="en-IN"/>
           </a:p>
@@ -2134,7 +2135,7 @@
           <a:p>
             <a:fld id="{33EDE7BA-5B6C-4896-A2E5-6A9DEAA77EB7}" type="datetimeFigureOut">
               <a:rPr lang="en-IN" smtClean="0"/>
-              <a:t>29-01-2023</a:t>
+              <a:t>28-04-2023</a:t>
             </a:fld>
             <a:endParaRPr lang="en-IN"/>
           </a:p>
@@ -2391,7 +2392,7 @@
           <a:p>
             <a:fld id="{33EDE7BA-5B6C-4896-A2E5-6A9DEAA77EB7}" type="datetimeFigureOut">
               <a:rPr lang="en-IN" smtClean="0"/>
-              <a:t>29-01-2023</a:t>
+              <a:t>28-04-2023</a:t>
             </a:fld>
             <a:endParaRPr lang="en-IN"/>
           </a:p>
@@ -2604,7 +2605,7 @@
           <a:p>
             <a:fld id="{33EDE7BA-5B6C-4896-A2E5-6A9DEAA77EB7}" type="datetimeFigureOut">
               <a:rPr lang="en-IN" smtClean="0"/>
-              <a:t>29-01-2023</a:t>
+              <a:t>28-04-2023</a:t>
             </a:fld>
             <a:endParaRPr lang="en-IN"/>
           </a:p>
@@ -4415,7 +4416,7 @@
               <a:buAutoNum type="arabicPeriod" startAt="3"/>
             </a:pPr>
             <a:r>
-              <a:rPr lang="en-IN" sz="2000" dirty="0">
+              <a:rPr lang="en-IN" sz="1900" dirty="0">
                 <a:solidFill>
                   <a:srgbClr val="000000"/>
                 </a:solidFill>
@@ -4426,7 +4427,7 @@
               </a:rPr>
               <a:t>Restaurant Table</a:t>
             </a:r>
-            <a:endParaRPr lang="en-IN" sz="2000" dirty="0">
+            <a:endParaRPr lang="en-IN" sz="1900" dirty="0">
               <a:effectLst/>
               <a:latin typeface="Times New Roman" panose="02020603050405020304" pitchFamily="18" charset="0"/>
               <a:ea typeface="Caladea"/>
@@ -4447,19 +4448,42 @@
               <a:buNone/>
             </a:pPr>
             <a:r>
-              <a:rPr lang="en-IN" sz="2000" dirty="0">
-                <a:solidFill>
-                  <a:srgbClr val="000000"/>
-                </a:solidFill>
-                <a:effectLst/>
-                <a:latin typeface="Times New Roman" panose="02020603050405020304" pitchFamily="18" charset="0"/>
-                <a:ea typeface="Calibri" panose="020F0502020204030204" pitchFamily="34" charset="0"/>
-                <a:cs typeface="Times New Roman" panose="02020603050405020304" pitchFamily="18" charset="0"/>
-              </a:rPr>
-              <a:t>restaurant (ID[PK], Restaurant Name, Restaurant Image, Restaurant Address, Restaurant City, Restaurant Contact No., Owner Name, Owner Contact No., Owner Email ID, Owner Password, Restaurant Documents, Restaurant Timing, cuisines [FK], Status, </a:t>
-            </a:r>
-            <a:r>
-              <a:rPr lang="en-IN" sz="2000" dirty="0" err="1">
+              <a:rPr lang="en-IN" sz="1900" dirty="0">
+                <a:solidFill>
+                  <a:srgbClr val="000000"/>
+                </a:solidFill>
+                <a:effectLst/>
+                <a:latin typeface="Times New Roman" panose="02020603050405020304" pitchFamily="18" charset="0"/>
+                <a:ea typeface="Calibri" panose="020F0502020204030204" pitchFamily="34" charset="0"/>
+                <a:cs typeface="Times New Roman" panose="02020603050405020304" pitchFamily="18" charset="0"/>
+              </a:rPr>
+              <a:t>restaurant (ID[PK], Restaurant Name, Restaurant Image, Restaurant Address, Restaurant City, Restaurant Contact No., Owner Name, Owner Contact No., Owner Email ID, Owner Password, </a:t>
+            </a:r>
+            <a:r>
+              <a:rPr lang="en-IN" sz="1900" dirty="0">
+                <a:solidFill>
+                  <a:srgbClr val="000000"/>
+                </a:solidFill>
+                <a:latin typeface="Times New Roman" panose="02020603050405020304" pitchFamily="18" charset="0"/>
+                <a:ea typeface="Calibri" panose="020F0502020204030204" pitchFamily="34" charset="0"/>
+                <a:cs typeface="Times New Roman" panose="02020603050405020304" pitchFamily="18" charset="0"/>
+              </a:rPr>
+              <a:t>R</a:t>
+            </a:r>
+            <a:r>
+              <a:rPr lang="en-IN" sz="1900" dirty="0">
+                <a:solidFill>
+                  <a:srgbClr val="000000"/>
+                </a:solidFill>
+                <a:effectLst/>
+                <a:latin typeface="Times New Roman" panose="02020603050405020304" pitchFamily="18" charset="0"/>
+                <a:ea typeface="Calibri" panose="020F0502020204030204" pitchFamily="34" charset="0"/>
+                <a:cs typeface="Times New Roman" panose="02020603050405020304" pitchFamily="18" charset="0"/>
+              </a:rPr>
+              <a:t>eset Password Token, Restaurant Documents, Restaurant Timing, cuisines [FK], Status, </a:t>
+            </a:r>
+            <a:r>
+              <a:rPr lang="en-IN" sz="1900" dirty="0" err="1">
                 <a:solidFill>
                   <a:srgbClr val="000000"/>
                 </a:solidFill>
@@ -4471,7 +4495,7 @@
               <a:t>createdAt</a:t>
             </a:r>
             <a:r>
-              <a:rPr lang="en-IN" sz="2000" dirty="0">
+              <a:rPr lang="en-IN" sz="1900" dirty="0">
                 <a:solidFill>
                   <a:srgbClr val="000000"/>
                 </a:solidFill>
@@ -4483,7 +4507,7 @@
               <a:t>, </a:t>
             </a:r>
             <a:r>
-              <a:rPr lang="en-IN" sz="2000" dirty="0" err="1">
+              <a:rPr lang="en-IN" sz="1900" dirty="0" err="1">
                 <a:solidFill>
                   <a:srgbClr val="000000"/>
                 </a:solidFill>
@@ -4495,7 +4519,7 @@
               <a:t>updatedAt</a:t>
             </a:r>
             <a:r>
-              <a:rPr lang="en-IN" sz="2000" dirty="0">
+              <a:rPr lang="en-IN" sz="1900" dirty="0">
                 <a:solidFill>
                   <a:srgbClr val="000000"/>
                 </a:solidFill>
@@ -4521,19 +4545,42 @@
               <a:buNone/>
             </a:pPr>
             <a:r>
-              <a:rPr lang="en-IN" sz="2000" dirty="0">
-                <a:solidFill>
-                  <a:srgbClr val="000000"/>
-                </a:solidFill>
-                <a:effectLst/>
-                <a:latin typeface="Times New Roman" panose="02020603050405020304" pitchFamily="18" charset="0"/>
-                <a:ea typeface="Calibri" panose="020F0502020204030204" pitchFamily="34" charset="0"/>
-                <a:cs typeface="Times New Roman" panose="02020603050405020304" pitchFamily="18" charset="0"/>
-              </a:rPr>
-              <a:t>FD: ID-&gt; {Restaurant Name, Restaurant Image, Restaurant Address, Restaurant City, Restaurant Contact No., Owner Name, Owner Contact No., Owner Email ID, Owner Password, Restaurant Documents, Restaurant Timing, cuisines [FK], Status, </a:t>
-            </a:r>
-            <a:r>
-              <a:rPr lang="en-IN" sz="2000" dirty="0" err="1">
+              <a:rPr lang="en-IN" sz="1900" dirty="0">
+                <a:solidFill>
+                  <a:srgbClr val="000000"/>
+                </a:solidFill>
+                <a:effectLst/>
+                <a:latin typeface="Times New Roman" panose="02020603050405020304" pitchFamily="18" charset="0"/>
+                <a:ea typeface="Calibri" panose="020F0502020204030204" pitchFamily="34" charset="0"/>
+                <a:cs typeface="Times New Roman" panose="02020603050405020304" pitchFamily="18" charset="0"/>
+              </a:rPr>
+              <a:t>FD: ID-&gt; {Restaurant Name, Restaurant Image, Restaurant Address, Restaurant City, Restaurant Contact No., Owner Name, Owner Contact No., Owner Email ID, Owner Password, </a:t>
+            </a:r>
+            <a:r>
+              <a:rPr lang="en-IN" sz="1900" dirty="0">
+                <a:solidFill>
+                  <a:srgbClr val="000000"/>
+                </a:solidFill>
+                <a:latin typeface="Times New Roman" panose="02020603050405020304" pitchFamily="18" charset="0"/>
+                <a:ea typeface="Calibri" panose="020F0502020204030204" pitchFamily="34" charset="0"/>
+                <a:cs typeface="Times New Roman" panose="02020603050405020304" pitchFamily="18" charset="0"/>
+              </a:rPr>
+              <a:t>R</a:t>
+            </a:r>
+            <a:r>
+              <a:rPr lang="en-IN" sz="1900" dirty="0">
+                <a:solidFill>
+                  <a:srgbClr val="000000"/>
+                </a:solidFill>
+                <a:effectLst/>
+                <a:latin typeface="Times New Roman" panose="02020603050405020304" pitchFamily="18" charset="0"/>
+                <a:ea typeface="Calibri" panose="020F0502020204030204" pitchFamily="34" charset="0"/>
+                <a:cs typeface="Times New Roman" panose="02020603050405020304" pitchFamily="18" charset="0"/>
+              </a:rPr>
+              <a:t>eset Password Token, Restaurant Documents, Restaurant Timing, cuisines [FK], Status, </a:t>
+            </a:r>
+            <a:r>
+              <a:rPr lang="en-IN" sz="1900" dirty="0" err="1">
                 <a:solidFill>
                   <a:srgbClr val="000000"/>
                 </a:solidFill>
@@ -4545,7 +4592,7 @@
               <a:t>createdAt</a:t>
             </a:r>
             <a:r>
-              <a:rPr lang="en-IN" sz="2000" dirty="0">
+              <a:rPr lang="en-IN" sz="1900" dirty="0">
                 <a:solidFill>
                   <a:srgbClr val="000000"/>
                 </a:solidFill>
@@ -4557,7 +4604,7 @@
               <a:t>, </a:t>
             </a:r>
             <a:r>
-              <a:rPr lang="en-IN" sz="2000" dirty="0" err="1">
+              <a:rPr lang="en-IN" sz="1900" dirty="0" err="1">
                 <a:solidFill>
                   <a:srgbClr val="000000"/>
                 </a:solidFill>
@@ -4569,7 +4616,7 @@
               <a:t>updatedAt</a:t>
             </a:r>
             <a:r>
-              <a:rPr lang="en-IN" sz="2000" dirty="0">
+              <a:rPr lang="en-IN" sz="1900" dirty="0">
                 <a:solidFill>
                   <a:srgbClr val="000000"/>
                 </a:solidFill>
@@ -4595,7 +4642,7 @@
               <a:buNone/>
             </a:pPr>
             <a:r>
-              <a:rPr lang="en-IN" sz="2000" dirty="0">
+              <a:rPr lang="en-IN" sz="1900" dirty="0">
                 <a:solidFill>
                   <a:srgbClr val="000000"/>
                 </a:solidFill>
@@ -4621,7 +4668,7 @@
               <a:buNone/>
             </a:pPr>
             <a:r>
-              <a:rPr lang="en-US" sz="2000" dirty="0">
+              <a:rPr lang="en-US" sz="1900" dirty="0">
                 <a:solidFill>
                   <a:srgbClr val="000000"/>
                 </a:solidFill>
@@ -4632,7 +4679,7 @@
               </a:rPr>
               <a:t>FD: Restaurant Timing-&gt; {Monday, Tuesday, Wednesday, Thursday, Friday, Saturday, Sunday}</a:t>
             </a:r>
-            <a:endParaRPr lang="en-IN" sz="2000" dirty="0">
+            <a:endParaRPr lang="en-IN" sz="1900" dirty="0">
               <a:solidFill>
                 <a:srgbClr val="000000"/>
               </a:solidFill>
@@ -6032,7 +6079,7 @@
                 <a:ea typeface="Calibri" panose="020F0502020204030204" pitchFamily="34" charset="0"/>
                 <a:cs typeface="Times New Roman" panose="02020603050405020304" pitchFamily="18" charset="0"/>
               </a:rPr>
-              <a:t>variant (ID[PK], Name, UOM, Price, Sales Price, Status, </a:t>
+              <a:t>variant (ID[PK], Name, UOM, Price, Sales Price, Approval Status, Status, </a:t>
             </a:r>
             <a:r>
               <a:rPr lang="en-US" sz="2000" dirty="0" err="1">
@@ -6106,7 +6153,7 @@
                 <a:ea typeface="Calibri" panose="020F0502020204030204" pitchFamily="34" charset="0"/>
                 <a:cs typeface="Times New Roman" panose="02020603050405020304" pitchFamily="18" charset="0"/>
               </a:rPr>
-              <a:t>FD:ID -&gt; {Name, UOM, Price, Sales Price, Status, </a:t>
+              <a:t>FD:ID -&gt; {Name, UOM, Price, Sales Price, Approval Status, Status, </a:t>
             </a:r>
             <a:r>
               <a:rPr lang="en-US" sz="2000" dirty="0" err="1">
@@ -6565,7 +6612,7 @@
               <a:buAutoNum type="arabicPeriod" startAt="11"/>
             </a:pPr>
             <a:r>
-              <a:rPr lang="en-IN" sz="2000" dirty="0">
+              <a:rPr lang="en-IN" sz="1900" dirty="0">
                 <a:solidFill>
                   <a:srgbClr val="000000"/>
                 </a:solidFill>
@@ -6591,7 +6638,7 @@
               <a:buNone/>
             </a:pPr>
             <a:r>
-              <a:rPr lang="en-IN" sz="2000" dirty="0">
+              <a:rPr lang="en-IN" sz="1900" dirty="0">
                 <a:solidFill>
                   <a:srgbClr val="000000"/>
                 </a:solidFill>
@@ -6603,7 +6650,7 @@
               <a:t>banner (ID[PK], restaurant [FK], Name, Image, Approval Status, Status, </a:t>
             </a:r>
             <a:r>
-              <a:rPr lang="en-IN" sz="2000" dirty="0" err="1">
+              <a:rPr lang="en-IN" sz="1900" dirty="0" err="1">
                 <a:solidFill>
                   <a:srgbClr val="000000"/>
                 </a:solidFill>
@@ -6615,7 +6662,7 @@
               <a:t>createdAt</a:t>
             </a:r>
             <a:r>
-              <a:rPr lang="en-IN" sz="2000" dirty="0">
+              <a:rPr lang="en-IN" sz="1900" dirty="0">
                 <a:solidFill>
                   <a:srgbClr val="000000"/>
                 </a:solidFill>
@@ -6627,7 +6674,7 @@
               <a:t>, </a:t>
             </a:r>
             <a:r>
-              <a:rPr lang="en-IN" sz="2000" dirty="0" err="1">
+              <a:rPr lang="en-IN" sz="1900" dirty="0" err="1">
                 <a:solidFill>
                   <a:srgbClr val="000000"/>
                 </a:solidFill>
@@ -6639,7 +6686,7 @@
               <a:t>updatedAt</a:t>
             </a:r>
             <a:r>
-              <a:rPr lang="en-IN" sz="2000" dirty="0">
+              <a:rPr lang="en-IN" sz="1900" dirty="0">
                 <a:solidFill>
                   <a:srgbClr val="000000"/>
                 </a:solidFill>
@@ -6665,7 +6712,7 @@
               <a:buNone/>
             </a:pPr>
             <a:r>
-              <a:rPr lang="en-IN" sz="2000" dirty="0">
+              <a:rPr lang="en-IN" sz="1900" dirty="0">
                 <a:solidFill>
                   <a:srgbClr val="000000"/>
                 </a:solidFill>
@@ -6677,7 +6724,7 @@
               <a:t>FD: ID-&gt; {restaurant [FK], Name, Image, Approval Status, Status, </a:t>
             </a:r>
             <a:r>
-              <a:rPr lang="en-IN" sz="2000" dirty="0" err="1">
+              <a:rPr lang="en-IN" sz="1900" dirty="0" err="1">
                 <a:solidFill>
                   <a:srgbClr val="000000"/>
                 </a:solidFill>
@@ -6689,7 +6736,7 @@
               <a:t>createdAt</a:t>
             </a:r>
             <a:r>
-              <a:rPr lang="en-IN" sz="2000" dirty="0">
+              <a:rPr lang="en-IN" sz="1900" dirty="0">
                 <a:solidFill>
                   <a:srgbClr val="000000"/>
                 </a:solidFill>
@@ -6701,7 +6748,7 @@
               <a:t>, </a:t>
             </a:r>
             <a:r>
-              <a:rPr lang="en-IN" sz="2000" dirty="0" err="1">
+              <a:rPr lang="en-IN" sz="1900" dirty="0" err="1">
                 <a:solidFill>
                   <a:srgbClr val="000000"/>
                 </a:solidFill>
@@ -6713,7 +6760,7 @@
               <a:t>updatedAt</a:t>
             </a:r>
             <a:r>
-              <a:rPr lang="en-IN" sz="2000" dirty="0">
+              <a:rPr lang="en-IN" sz="1900" dirty="0">
                 <a:solidFill>
                   <a:srgbClr val="000000"/>
                 </a:solidFill>
@@ -6740,7 +6787,7 @@
               <a:buAutoNum type="arabicPeriod" startAt="12"/>
             </a:pPr>
             <a:r>
-              <a:rPr lang="en-US" sz="2000" dirty="0">
+              <a:rPr lang="en-US" sz="1900" dirty="0">
                 <a:solidFill>
                   <a:srgbClr val="000000"/>
                 </a:solidFill>
@@ -6766,7 +6813,7 @@
               <a:buNone/>
             </a:pPr>
             <a:r>
-              <a:rPr lang="en-US" sz="2000" dirty="0" err="1">
+              <a:rPr lang="en-US" sz="1900" dirty="0" err="1">
                 <a:solidFill>
                   <a:srgbClr val="000000"/>
                 </a:solidFill>
@@ -6778,16 +6825,64 @@
               <a:t>deliveryboy</a:t>
             </a:r>
             <a:r>
-              <a:rPr lang="en-US" sz="2000" dirty="0">
-                <a:solidFill>
-                  <a:srgbClr val="000000"/>
-                </a:solidFill>
-                <a:effectLst/>
-                <a:latin typeface="Times New Roman" panose="02020603050405020304" pitchFamily="18" charset="0"/>
-                <a:ea typeface="Caladea"/>
-                <a:cs typeface="Caladea"/>
-              </a:rPr>
-              <a:t> (ID[PK], Name, Mobile, Password, Status, Added on)</a:t>
+              <a:rPr lang="en-US" sz="1900" dirty="0">
+                <a:solidFill>
+                  <a:srgbClr val="000000"/>
+                </a:solidFill>
+                <a:effectLst/>
+                <a:latin typeface="Times New Roman" panose="02020603050405020304" pitchFamily="18" charset="0"/>
+                <a:ea typeface="Caladea"/>
+                <a:cs typeface="Caladea"/>
+              </a:rPr>
+              <a:t> (ID[PK], Name, Mobile, Password, Status, </a:t>
+            </a:r>
+            <a:r>
+              <a:rPr lang="en-IN" sz="1900" dirty="0" err="1">
+                <a:solidFill>
+                  <a:srgbClr val="000000"/>
+                </a:solidFill>
+                <a:effectLst/>
+                <a:latin typeface="Times New Roman" panose="02020603050405020304" pitchFamily="18" charset="0"/>
+                <a:ea typeface="Caladea"/>
+                <a:cs typeface="Caladea"/>
+              </a:rPr>
+              <a:t>createdAt</a:t>
+            </a:r>
+            <a:r>
+              <a:rPr lang="en-IN" sz="1900" dirty="0">
+                <a:solidFill>
+                  <a:srgbClr val="000000"/>
+                </a:solidFill>
+                <a:effectLst/>
+                <a:latin typeface="Times New Roman" panose="02020603050405020304" pitchFamily="18" charset="0"/>
+                <a:ea typeface="Caladea"/>
+                <a:cs typeface="Caladea"/>
+              </a:rPr>
+              <a:t>, </a:t>
+            </a:r>
+            <a:r>
+              <a:rPr lang="en-IN" sz="1900" dirty="0" err="1">
+                <a:solidFill>
+                  <a:srgbClr val="000000"/>
+                </a:solidFill>
+                <a:effectLst/>
+                <a:latin typeface="Times New Roman" panose="02020603050405020304" pitchFamily="18" charset="0"/>
+                <a:ea typeface="Caladea"/>
+                <a:cs typeface="Caladea"/>
+              </a:rPr>
+              <a:t>updatedAt</a:t>
+            </a:r>
+            <a:r>
+              <a:rPr lang="en-US" sz="1900" dirty="0">
+                <a:solidFill>
+                  <a:srgbClr val="000000"/>
+                </a:solidFill>
+                <a:effectLst/>
+                <a:latin typeface="Times New Roman" panose="02020603050405020304" pitchFamily="18" charset="0"/>
+                <a:ea typeface="Caladea"/>
+                <a:cs typeface="Caladea"/>
+              </a:rPr>
+              <a:t>)</a:t>
             </a:r>
           </a:p>
           <a:p>
@@ -6804,16 +6899,64 @@
               <a:buNone/>
             </a:pPr>
             <a:r>
-              <a:rPr lang="en-US" sz="2000" dirty="0">
-                <a:solidFill>
-                  <a:srgbClr val="000000"/>
-                </a:solidFill>
-                <a:effectLst/>
-                <a:latin typeface="Times New Roman" panose="02020603050405020304" pitchFamily="18" charset="0"/>
-                <a:ea typeface="Caladea"/>
-                <a:cs typeface="Caladea"/>
-              </a:rPr>
-              <a:t>FD: ID-&gt; {Name, Mobile, Password, Status, Added on}</a:t>
+              <a:rPr lang="en-US" sz="1900" dirty="0">
+                <a:solidFill>
+                  <a:srgbClr val="000000"/>
+                </a:solidFill>
+                <a:effectLst/>
+                <a:latin typeface="Times New Roman" panose="02020603050405020304" pitchFamily="18" charset="0"/>
+                <a:ea typeface="Caladea"/>
+                <a:cs typeface="Caladea"/>
+              </a:rPr>
+              <a:t>FD: ID-&gt; {Name, Mobile, Password, Status, </a:t>
+            </a:r>
+            <a:r>
+              <a:rPr lang="en-IN" sz="1900" dirty="0" err="1">
+                <a:solidFill>
+                  <a:srgbClr val="000000"/>
+                </a:solidFill>
+                <a:effectLst/>
+                <a:latin typeface="Times New Roman" panose="02020603050405020304" pitchFamily="18" charset="0"/>
+                <a:ea typeface="Caladea"/>
+                <a:cs typeface="Caladea"/>
+              </a:rPr>
+              <a:t>createdAt</a:t>
+            </a:r>
+            <a:r>
+              <a:rPr lang="en-IN" sz="1900" dirty="0">
+                <a:solidFill>
+                  <a:srgbClr val="000000"/>
+                </a:solidFill>
+                <a:effectLst/>
+                <a:latin typeface="Times New Roman" panose="02020603050405020304" pitchFamily="18" charset="0"/>
+                <a:ea typeface="Caladea"/>
+                <a:cs typeface="Caladea"/>
+              </a:rPr>
+              <a:t>, </a:t>
+            </a:r>
+            <a:r>
+              <a:rPr lang="en-IN" sz="1900" dirty="0" err="1">
+                <a:solidFill>
+                  <a:srgbClr val="000000"/>
+                </a:solidFill>
+                <a:effectLst/>
+                <a:latin typeface="Times New Roman" panose="02020603050405020304" pitchFamily="18" charset="0"/>
+                <a:ea typeface="Caladea"/>
+                <a:cs typeface="Caladea"/>
+              </a:rPr>
+              <a:t>updatedAt</a:t>
+            </a:r>
+            <a:r>
+              <a:rPr lang="en-US" sz="1900" dirty="0">
+                <a:solidFill>
+                  <a:srgbClr val="000000"/>
+                </a:solidFill>
+                <a:effectLst/>
+                <a:latin typeface="Times New Roman" panose="02020603050405020304" pitchFamily="18" charset="0"/>
+                <a:ea typeface="Caladea"/>
+                <a:cs typeface="Caladea"/>
+              </a:rPr>
+              <a:t>}</a:t>
             </a:r>
           </a:p>
           <a:p>
@@ -6831,7 +6974,7 @@
               <a:buAutoNum type="arabicPeriod" startAt="13"/>
             </a:pPr>
             <a:r>
-              <a:rPr lang="en-IN" sz="2000" dirty="0">
+              <a:rPr lang="en-IN" sz="1900" dirty="0">
                 <a:solidFill>
                   <a:srgbClr val="000000"/>
                 </a:solidFill>
@@ -6857,7 +7000,7 @@
               <a:buNone/>
             </a:pPr>
             <a:r>
-              <a:rPr lang="en-IN" sz="2000" dirty="0" err="1">
+              <a:rPr lang="en-IN" sz="1900" dirty="0" err="1">
                 <a:solidFill>
                   <a:srgbClr val="000000"/>
                 </a:solidFill>
@@ -6869,7 +7012,7 @@
               <a:t>couponcode</a:t>
             </a:r>
             <a:r>
-              <a:rPr lang="en-IN" sz="2000" dirty="0">
+              <a:rPr lang="en-IN" sz="1900" dirty="0">
                 <a:solidFill>
                   <a:srgbClr val="000000"/>
                 </a:solidFill>
@@ -6881,7 +7024,7 @@
               <a:t> (ID[PK], Coupon code, Coupon type, Coupon value, Cart min value, Expired on, Status, </a:t>
             </a:r>
             <a:r>
-              <a:rPr lang="en-IN" sz="2000" dirty="0" err="1">
+              <a:rPr lang="en-IN" sz="1900" dirty="0" err="1">
                 <a:solidFill>
                   <a:srgbClr val="000000"/>
                 </a:solidFill>
@@ -6893,7 +7036,7 @@
               <a:t>createdAt</a:t>
             </a:r>
             <a:r>
-              <a:rPr lang="en-IN" sz="2000" dirty="0">
+              <a:rPr lang="en-IN" sz="1900" dirty="0">
                 <a:solidFill>
                   <a:srgbClr val="000000"/>
                 </a:solidFill>
@@ -6905,7 +7048,7 @@
               <a:t>, </a:t>
             </a:r>
             <a:r>
-              <a:rPr lang="en-IN" sz="2000" dirty="0" err="1">
+              <a:rPr lang="en-IN" sz="1900" dirty="0" err="1">
                 <a:solidFill>
                   <a:srgbClr val="000000"/>
                 </a:solidFill>
@@ -6917,7 +7060,7 @@
               <a:t>updatedAt</a:t>
             </a:r>
             <a:r>
-              <a:rPr lang="en-IN" sz="2000" dirty="0">
+              <a:rPr lang="en-IN" sz="1900" dirty="0">
                 <a:solidFill>
                   <a:srgbClr val="000000"/>
                 </a:solidFill>
@@ -6943,7 +7086,7 @@
               <a:buNone/>
             </a:pPr>
             <a:r>
-              <a:rPr lang="en-IN" sz="2000" dirty="0">
+              <a:rPr lang="en-IN" sz="1900" dirty="0">
                 <a:solidFill>
                   <a:srgbClr val="000000"/>
                 </a:solidFill>
@@ -6955,7 +7098,7 @@
               <a:t>FD: ID-&gt; {Coupon code, Coupon type, Coupon value, Cart min value, Expired on, Status, </a:t>
             </a:r>
             <a:r>
-              <a:rPr lang="en-IN" sz="2000" dirty="0" err="1">
+              <a:rPr lang="en-IN" sz="1900" dirty="0" err="1">
                 <a:solidFill>
                   <a:srgbClr val="000000"/>
                 </a:solidFill>
@@ -6967,7 +7110,7 @@
               <a:t>createdAt</a:t>
             </a:r>
             <a:r>
-              <a:rPr lang="en-IN" sz="2000" dirty="0">
+              <a:rPr lang="en-IN" sz="1900" dirty="0">
                 <a:solidFill>
                   <a:srgbClr val="000000"/>
                 </a:solidFill>
@@ -6979,7 +7122,7 @@
               <a:t>, </a:t>
             </a:r>
             <a:r>
-              <a:rPr lang="en-IN" sz="2000" dirty="0" err="1">
+              <a:rPr lang="en-IN" sz="1900" dirty="0" err="1">
                 <a:solidFill>
                   <a:srgbClr val="000000"/>
                 </a:solidFill>
@@ -6991,7 +7134,7 @@
               <a:t>updatedAt</a:t>
             </a:r>
             <a:r>
-              <a:rPr lang="en-IN" sz="2000" dirty="0">
+              <a:rPr lang="en-IN" sz="1900" dirty="0">
                 <a:solidFill>
                   <a:srgbClr val="000000"/>
                 </a:solidFill>
@@ -7017,7 +7160,7 @@
               <a:buFont typeface="+mj-lt"/>
               <a:buAutoNum type="arabicPeriod" startAt="13"/>
             </a:pPr>
-            <a:endParaRPr lang="en-IN" sz="2000" dirty="0">
+            <a:endParaRPr lang="en-IN" sz="1900" dirty="0">
               <a:solidFill>
                 <a:srgbClr val="000000"/>
               </a:solidFill>
@@ -7542,7 +7685,7 @@
                 <a:ea typeface="Caladea"/>
                 <a:cs typeface="Caladea"/>
               </a:rPr>
-              <a:t>customer (ID[PK], Name, Email ID, Password, Contact No., Billing Address [FK], Email Verify, Random String, Referral Code, From Referral Code, Status, </a:t>
+              <a:t>customer (ID[PK], Name, Email ID, Password, Contact No., Billing Address [FK], OTP, Hash, Referral Code, From Referral Code, Status, </a:t>
             </a:r>
             <a:r>
               <a:rPr lang="en-IN" sz="2000" dirty="0" err="1">
@@ -7616,7 +7759,7 @@
                 <a:ea typeface="Caladea"/>
                 <a:cs typeface="Caladea"/>
               </a:rPr>
-              <a:t>FD: ID-&gt; {Name, Email ID, Password, Contact No., Billing Address [FK], Email Verify, Random String, Referral Code, From Referral Code, Status, </a:t>
+              <a:t>FD: ID-&gt; {Name, Email ID, Password, Contact No., Billing Address [FK], OTP, Hash, Referral Code, From Referral Code, Status, </a:t>
             </a:r>
             <a:r>
               <a:rPr lang="en-IN" sz="2000" dirty="0" err="1">
@@ -7986,7 +8129,55 @@
                 <a:ea typeface="Caladea"/>
                 <a:cs typeface="Caladea"/>
               </a:rPr>
-              <a:t>cart (ID[PK], customer [FK], item [FK], Qty, </a:t>
+              <a:t>cart (ID[PK], customer [FK], item [FK], </a:t>
+            </a:r>
+            <a:r>
+              <a:rPr lang="en-IN" sz="2000" dirty="0" err="1">
+                <a:solidFill>
+                  <a:srgbClr val="000000"/>
+                </a:solidFill>
+                <a:effectLst/>
+                <a:latin typeface="Times New Roman" panose="02020603050405020304" pitchFamily="18" charset="0"/>
+                <a:ea typeface="Caladea"/>
+                <a:cs typeface="Caladea"/>
+              </a:rPr>
+              <a:t>addedon</a:t>
+            </a:r>
+            <a:r>
+              <a:rPr lang="en-IN" sz="2000" dirty="0">
+                <a:solidFill>
+                  <a:srgbClr val="000000"/>
+                </a:solidFill>
+                <a:effectLst/>
+                <a:latin typeface="Times New Roman" panose="02020603050405020304" pitchFamily="18" charset="0"/>
+                <a:ea typeface="Caladea"/>
+                <a:cs typeface="Caladea"/>
+              </a:rPr>
+              <a:t> [FK], </a:t>
+            </a:r>
+            <a:r>
+              <a:rPr lang="en-IN" sz="2000" dirty="0" err="1">
+                <a:solidFill>
+                  <a:srgbClr val="000000"/>
+                </a:solidFill>
+                <a:effectLst/>
+                <a:latin typeface="Times New Roman" panose="02020603050405020304" pitchFamily="18" charset="0"/>
+                <a:ea typeface="Caladea"/>
+                <a:cs typeface="Caladea"/>
+              </a:rPr>
+              <a:t>addextra</a:t>
+            </a:r>
+            <a:r>
+              <a:rPr lang="en-IN" sz="2000" dirty="0">
+                <a:solidFill>
+                  <a:srgbClr val="000000"/>
+                </a:solidFill>
+                <a:effectLst/>
+                <a:latin typeface="Times New Roman" panose="02020603050405020304" pitchFamily="18" charset="0"/>
+                <a:ea typeface="Caladea"/>
+                <a:cs typeface="Caladea"/>
+              </a:rPr>
+              <a:t> [FK], Qty, Price, </a:t>
             </a:r>
             <a:r>
               <a:rPr lang="en-IN" sz="2000" dirty="0" err="1">
@@ -8108,7 +8299,7 @@
                 <a:ea typeface="Caladea"/>
                 <a:cs typeface="Caladea"/>
               </a:rPr>
-              <a:t> [FK], Qty, </a:t>
+              <a:t> [FK], Qty, Price, </a:t>
             </a:r>
             <a:r>
               <a:rPr lang="en-IN" sz="2000" dirty="0" err="1">
@@ -8281,7 +8472,7 @@
                 <a:ea typeface="Caladea"/>
                 <a:cs typeface="Caladea"/>
               </a:rPr>
-              <a:t>Order Table</a:t>
+              <a:t>Order Master</a:t>
             </a:r>
           </a:p>
           <a:p>
@@ -8307,7 +8498,7 @@
                 <a:ea typeface="Caladea"/>
                 <a:cs typeface="Caladea"/>
               </a:rPr>
-              <a:t>Order (ID[PK], customer [FK], Billing Address [FK], Price, Coupon Code [FK], Total Price, Delivery Boy [FK], Payment Status, Payment Type, Payment ID, Order Status, Cancel By, Cancel At, Delivered On, Refund Status, item [FK], Qty, </a:t>
+              <a:t>Order (ID[PK], customer [FK], Billing Address [FK], Price, Coupon Code [FK], Total Price, Delivery Boy [FK], Payment Status, Payment Type, Payment ID, Order Status, Cancel By, Cancel At, Delivered On, Refund Status, </a:t>
             </a:r>
             <a:r>
               <a:rPr lang="en-IN" sz="2000" dirty="0" err="1">
@@ -8372,199 +8563,65 @@
               <a:buNone/>
             </a:pPr>
             <a:r>
-              <a:rPr lang="en-US" sz="1800" dirty="0">
-                <a:effectLst/>
-                <a:latin typeface="Times New Roman" panose="02020603050405020304" pitchFamily="18" charset="0"/>
-                <a:ea typeface="Calibri" panose="020F0502020204030204" pitchFamily="34" charset="0"/>
-              </a:rPr>
-              <a:t>FD: ID-&gt; {customer [FK], Billing Address [FK], Price, Coupon Code [FK], Total Price, Delivery Boy [FK], Payment Status, Payment Type, Payment ID, Order Status, Cancel By, Cancel At, Delivered On, Refund Status, item [FK], </a:t>
-            </a:r>
-            <a:r>
-              <a:rPr lang="en-US" sz="1800" dirty="0" err="1">
-                <a:effectLst/>
-                <a:latin typeface="Times New Roman" panose="02020603050405020304" pitchFamily="18" charset="0"/>
-                <a:ea typeface="Calibri" panose="020F0502020204030204" pitchFamily="34" charset="0"/>
-              </a:rPr>
-              <a:t>addedon</a:t>
-            </a:r>
-            <a:r>
-              <a:rPr lang="en-US" sz="1800" dirty="0">
-                <a:effectLst/>
-                <a:latin typeface="Times New Roman" panose="02020603050405020304" pitchFamily="18" charset="0"/>
-                <a:ea typeface="Calibri" panose="020F0502020204030204" pitchFamily="34" charset="0"/>
-              </a:rPr>
-              <a:t> [FK], </a:t>
-            </a:r>
-            <a:r>
-              <a:rPr lang="en-US" sz="1800" dirty="0" err="1">
-                <a:effectLst/>
-                <a:latin typeface="Times New Roman" panose="02020603050405020304" pitchFamily="18" charset="0"/>
-                <a:ea typeface="Calibri" panose="020F0502020204030204" pitchFamily="34" charset="0"/>
-              </a:rPr>
-              <a:t>addextra</a:t>
-            </a:r>
-            <a:r>
-              <a:rPr lang="en-US" sz="1800" dirty="0">
-                <a:effectLst/>
-                <a:latin typeface="Times New Roman" panose="02020603050405020304" pitchFamily="18" charset="0"/>
-                <a:ea typeface="Calibri" panose="020F0502020204030204" pitchFamily="34" charset="0"/>
-              </a:rPr>
-              <a:t> [FK], Qty, </a:t>
-            </a:r>
-            <a:r>
-              <a:rPr lang="en-US" sz="1800" dirty="0" err="1">
-                <a:effectLst/>
-                <a:latin typeface="Times New Roman" panose="02020603050405020304" pitchFamily="18" charset="0"/>
-                <a:ea typeface="Calibri" panose="020F0502020204030204" pitchFamily="34" charset="0"/>
+              <a:rPr lang="en-IN" sz="2000" dirty="0">
+                <a:solidFill>
+                  <a:srgbClr val="000000"/>
+                </a:solidFill>
+                <a:effectLst/>
+                <a:latin typeface="Times New Roman" panose="02020603050405020304" pitchFamily="18" charset="0"/>
+                <a:ea typeface="Caladea"/>
+                <a:cs typeface="Caladea"/>
+              </a:rPr>
+              <a:t>FD: ID-&gt; {customer [FK], Billing Address [FK], Price, Coupon Code [FK], Total Price, Delivery Boy [FK], Payment Status, Payment Type, Payment ID, Order Status, Cancel By, Cancel At, Delivered On, Refund Status, </a:t>
+            </a:r>
+            <a:r>
+              <a:rPr lang="en-IN" sz="2000" dirty="0" err="1">
+                <a:solidFill>
+                  <a:srgbClr val="000000"/>
+                </a:solidFill>
+                <a:effectLst/>
+                <a:latin typeface="Times New Roman" panose="02020603050405020304" pitchFamily="18" charset="0"/>
+                <a:ea typeface="Caladea"/>
+                <a:cs typeface="Caladea"/>
               </a:rPr>
               <a:t>createdAt</a:t>
             </a:r>
             <a:r>
-              <a:rPr lang="en-US" sz="1800" dirty="0">
-                <a:effectLst/>
-                <a:latin typeface="Times New Roman" panose="02020603050405020304" pitchFamily="18" charset="0"/>
-                <a:ea typeface="Calibri" panose="020F0502020204030204" pitchFamily="34" charset="0"/>
+              <a:rPr lang="en-IN" sz="2000" dirty="0">
+                <a:solidFill>
+                  <a:srgbClr val="000000"/>
+                </a:solidFill>
+                <a:effectLst/>
+                <a:latin typeface="Times New Roman" panose="02020603050405020304" pitchFamily="18" charset="0"/>
+                <a:ea typeface="Caladea"/>
+                <a:cs typeface="Caladea"/>
               </a:rPr>
               <a:t>, </a:t>
             </a:r>
             <a:r>
-              <a:rPr lang="en-US" sz="1800" dirty="0" err="1">
-                <a:effectLst/>
-                <a:latin typeface="Times New Roman" panose="02020603050405020304" pitchFamily="18" charset="0"/>
-                <a:ea typeface="Calibri" panose="020F0502020204030204" pitchFamily="34" charset="0"/>
+              <a:rPr lang="en-IN" sz="2000" dirty="0" err="1">
+                <a:solidFill>
+                  <a:srgbClr val="000000"/>
+                </a:solidFill>
+                <a:effectLst/>
+                <a:latin typeface="Times New Roman" panose="02020603050405020304" pitchFamily="18" charset="0"/>
+                <a:ea typeface="Caladea"/>
+                <a:cs typeface="Caladea"/>
               </a:rPr>
               <a:t>updatedAt</a:t>
             </a:r>
             <a:r>
-              <a:rPr lang="en-US" sz="1800" dirty="0">
-                <a:effectLst/>
-                <a:latin typeface="Times New Roman" panose="02020603050405020304" pitchFamily="18" charset="0"/>
-                <a:ea typeface="Calibri" panose="020F0502020204030204" pitchFamily="34" charset="0"/>
+              <a:rPr lang="en-IN" sz="2000" dirty="0">
+                <a:solidFill>
+                  <a:srgbClr val="000000"/>
+                </a:solidFill>
+                <a:effectLst/>
+                <a:latin typeface="Times New Roman" panose="02020603050405020304" pitchFamily="18" charset="0"/>
+                <a:ea typeface="Caladea"/>
+                <a:cs typeface="Caladea"/>
               </a:rPr>
               <a:t>}</a:t>
             </a:r>
-          </a:p>
-          <a:p>
-            <a:pPr marL="457200" marR="0" lvl="0" indent="-457200" algn="just">
-              <a:lnSpc>
-                <a:spcPct val="150000"/>
-              </a:lnSpc>
-              <a:spcBef>
-                <a:spcPts val="0"/>
-              </a:spcBef>
-              <a:spcAft>
-                <a:spcPts val="0"/>
-              </a:spcAft>
-              <a:buFont typeface="+mj-lt"/>
-              <a:buAutoNum type="arabicPeriod" startAt="19"/>
-            </a:pPr>
-            <a:r>
-              <a:rPr lang="en-IN" sz="2000" dirty="0">
-                <a:solidFill>
-                  <a:srgbClr val="000000"/>
-                </a:solidFill>
-                <a:effectLst/>
-                <a:latin typeface="Times New Roman" panose="02020603050405020304" pitchFamily="18" charset="0"/>
-                <a:ea typeface="Caladea"/>
-                <a:cs typeface="Caladea"/>
-              </a:rPr>
-              <a:t>Get Touch Table</a:t>
-            </a:r>
-          </a:p>
-          <a:p>
-            <a:pPr marL="0" marR="0" lvl="0" indent="0" algn="just">
-              <a:lnSpc>
-                <a:spcPct val="150000"/>
-              </a:lnSpc>
-              <a:spcBef>
-                <a:spcPts val="0"/>
-              </a:spcBef>
-              <a:spcAft>
-                <a:spcPts val="0"/>
-              </a:spcAft>
-              <a:buNone/>
-            </a:pPr>
-            <a:r>
-              <a:rPr lang="en-US" sz="2000" dirty="0" err="1">
-                <a:solidFill>
-                  <a:srgbClr val="000000"/>
-                </a:solidFill>
-                <a:effectLst/>
-                <a:latin typeface="Times New Roman" panose="02020603050405020304" pitchFamily="18" charset="0"/>
-                <a:ea typeface="Caladea"/>
-                <a:cs typeface="Caladea"/>
-              </a:rPr>
-              <a:t>gettouch</a:t>
-            </a:r>
-            <a:r>
-              <a:rPr lang="en-US" sz="2000" dirty="0">
-                <a:solidFill>
-                  <a:srgbClr val="000000"/>
-                </a:solidFill>
-                <a:effectLst/>
-                <a:latin typeface="Times New Roman" panose="02020603050405020304" pitchFamily="18" charset="0"/>
-                <a:ea typeface="Caladea"/>
-                <a:cs typeface="Caladea"/>
-              </a:rPr>
-              <a:t> (ID [PK], restaurant [FK], Subject, Message, Status, </a:t>
-            </a:r>
-            <a:r>
-              <a:rPr lang="en-US" sz="2000" dirty="0" err="1">
-                <a:solidFill>
-                  <a:srgbClr val="000000"/>
-                </a:solidFill>
-                <a:effectLst/>
-                <a:latin typeface="Times New Roman" panose="02020603050405020304" pitchFamily="18" charset="0"/>
-                <a:ea typeface="Caladea"/>
-                <a:cs typeface="Caladea"/>
-              </a:rPr>
-              <a:t>createdAt</a:t>
-            </a:r>
-            <a:r>
-              <a:rPr lang="en-US" sz="2000" dirty="0">
-                <a:solidFill>
-                  <a:srgbClr val="000000"/>
-                </a:solidFill>
-                <a:effectLst/>
-                <a:latin typeface="Times New Roman" panose="02020603050405020304" pitchFamily="18" charset="0"/>
-                <a:ea typeface="Caladea"/>
-                <a:cs typeface="Caladea"/>
-              </a:rPr>
-              <a:t>, </a:t>
-            </a:r>
-            <a:r>
-              <a:rPr lang="en-US" sz="2000" dirty="0" err="1">
-                <a:solidFill>
-                  <a:srgbClr val="000000"/>
-                </a:solidFill>
-                <a:effectLst/>
-                <a:latin typeface="Times New Roman" panose="02020603050405020304" pitchFamily="18" charset="0"/>
-                <a:ea typeface="Caladea"/>
-                <a:cs typeface="Caladea"/>
-              </a:rPr>
-              <a:t>updatedAt</a:t>
-            </a:r>
-            <a:r>
-              <a:rPr lang="en-US" sz="2000" dirty="0">
-                <a:solidFill>
-                  <a:srgbClr val="000000"/>
-                </a:solidFill>
-                <a:effectLst/>
-                <a:latin typeface="Times New Roman" panose="02020603050405020304" pitchFamily="18" charset="0"/>
-                <a:ea typeface="Caladea"/>
-                <a:cs typeface="Caladea"/>
-              </a:rPr>
-              <a:t>)</a:t>
-            </a:r>
-            <a:endParaRPr lang="en-IN" sz="2000" dirty="0">
-              <a:solidFill>
-                <a:srgbClr val="000000"/>
-              </a:solidFill>
-              <a:effectLst/>
-              <a:latin typeface="Times New Roman" panose="02020603050405020304" pitchFamily="18" charset="0"/>
-              <a:ea typeface="Caladea"/>
-              <a:cs typeface="Caladea"/>
-            </a:endParaRPr>
           </a:p>
         </p:txBody>
       </p:sp>
@@ -8665,6 +8722,33 @@
           </a:bodyPr>
           <a:lstStyle/>
           <a:p>
+            <a:pPr marL="457200" marR="0" lvl="0" indent="-457200" algn="just">
+              <a:lnSpc>
+                <a:spcPct val="150000"/>
+              </a:lnSpc>
+              <a:spcBef>
+                <a:spcPts val="0"/>
+              </a:spcBef>
+              <a:spcAft>
+                <a:spcPts val="0"/>
+              </a:spcAft>
+              <a:buFont typeface="+mj-lt"/>
+              <a:buAutoNum type="arabicPeriod" startAt="19"/>
+            </a:pPr>
+            <a:r>
+              <a:rPr lang="en-IN" sz="2000" dirty="0">
+                <a:solidFill>
+                  <a:srgbClr val="000000"/>
+                </a:solidFill>
+                <a:effectLst/>
+                <a:latin typeface="Times New Roman" panose="02020603050405020304" pitchFamily="18" charset="0"/>
+                <a:ea typeface="Caladea"/>
+                <a:cs typeface="Caladea"/>
+              </a:rPr>
+              <a:t>Order Detail Table</a:t>
+            </a:r>
+          </a:p>
+          <a:p>
             <a:pPr marL="0" marR="0" lvl="0" indent="0" algn="just">
               <a:lnSpc>
                 <a:spcPct val="150000"/>
@@ -8678,19 +8762,67 @@
               <a:buNone/>
             </a:pPr>
             <a:r>
-              <a:rPr lang="en-US" sz="2000" dirty="0">
-                <a:solidFill>
-                  <a:srgbClr val="000000"/>
-                </a:solidFill>
-                <a:effectLst/>
-                <a:latin typeface="Times New Roman" panose="02020603050405020304" pitchFamily="18" charset="0"/>
-                <a:ea typeface="Caladea"/>
-                <a:cs typeface="Caladea"/>
-              </a:rPr>
-              <a:t>FD: ID-&gt; {restaurant [FK], Subject, Message, Status, </a:t>
-            </a:r>
-            <a:r>
-              <a:rPr lang="en-US" sz="2000" dirty="0" err="1">
+              <a:rPr lang="en-IN" sz="2000" dirty="0">
+                <a:solidFill>
+                  <a:srgbClr val="000000"/>
+                </a:solidFill>
+                <a:effectLst/>
+                <a:latin typeface="Times New Roman" panose="02020603050405020304" pitchFamily="18" charset="0"/>
+                <a:ea typeface="Caladea"/>
+                <a:cs typeface="Caladea"/>
+              </a:rPr>
+              <a:t>Order (ID[PK], Order Master [FK], item [FK], Qty, variant [FK], </a:t>
+            </a:r>
+            <a:r>
+              <a:rPr lang="en-IN" sz="2000" dirty="0" err="1">
+                <a:solidFill>
+                  <a:srgbClr val="000000"/>
+                </a:solidFill>
+                <a:effectLst/>
+                <a:latin typeface="Times New Roman" panose="02020603050405020304" pitchFamily="18" charset="0"/>
+                <a:ea typeface="Caladea"/>
+                <a:cs typeface="Caladea"/>
+              </a:rPr>
+              <a:t>addedon</a:t>
+            </a:r>
+            <a:r>
+              <a:rPr lang="en-IN" sz="2000" dirty="0">
+                <a:solidFill>
+                  <a:srgbClr val="000000"/>
+                </a:solidFill>
+                <a:effectLst/>
+                <a:latin typeface="Times New Roman" panose="02020603050405020304" pitchFamily="18" charset="0"/>
+                <a:ea typeface="Caladea"/>
+                <a:cs typeface="Caladea"/>
+              </a:rPr>
+              <a:t> [FK], </a:t>
+            </a:r>
+            <a:r>
+              <a:rPr lang="en-IN" sz="2000" dirty="0" err="1">
+                <a:solidFill>
+                  <a:srgbClr val="000000"/>
+                </a:solidFill>
+                <a:effectLst/>
+                <a:latin typeface="Times New Roman" panose="02020603050405020304" pitchFamily="18" charset="0"/>
+                <a:ea typeface="Caladea"/>
+                <a:cs typeface="Caladea"/>
+              </a:rPr>
+              <a:t>addextra</a:t>
+            </a:r>
+            <a:r>
+              <a:rPr lang="en-IN" sz="2000" dirty="0">
+                <a:solidFill>
+                  <a:srgbClr val="000000"/>
+                </a:solidFill>
+                <a:effectLst/>
+                <a:latin typeface="Times New Roman" panose="02020603050405020304" pitchFamily="18" charset="0"/>
+                <a:ea typeface="Caladea"/>
+                <a:cs typeface="Caladea"/>
+              </a:rPr>
+              <a:t> [FK], </a:t>
+            </a:r>
+            <a:r>
+              <a:rPr lang="en-IN" sz="2000" dirty="0" err="1">
                 <a:solidFill>
                   <a:srgbClr val="000000"/>
                 </a:solidFill>
@@ -8702,7 +8834,7 @@
               <a:t>createdAt</a:t>
             </a:r>
             <a:r>
-              <a:rPr lang="en-US" sz="2000" dirty="0">
+              <a:rPr lang="en-IN" sz="2000" dirty="0">
                 <a:solidFill>
                   <a:srgbClr val="000000"/>
                 </a:solidFill>
@@ -8714,7 +8846,7 @@
               <a:t>, </a:t>
             </a:r>
             <a:r>
-              <a:rPr lang="en-US" sz="2000" dirty="0" err="1">
+              <a:rPr lang="en-IN" sz="2000" dirty="0" err="1">
                 <a:solidFill>
                   <a:srgbClr val="000000"/>
                 </a:solidFill>
@@ -8726,7 +8858,129 @@
               <a:t>updatedAt</a:t>
             </a:r>
             <a:r>
-              <a:rPr lang="en-US" sz="2000" dirty="0">
+              <a:rPr lang="en-IN" sz="2000" dirty="0">
+                <a:solidFill>
+                  <a:srgbClr val="000000"/>
+                </a:solidFill>
+                <a:effectLst/>
+                <a:latin typeface="Times New Roman" panose="02020603050405020304" pitchFamily="18" charset="0"/>
+                <a:ea typeface="Caladea"/>
+                <a:cs typeface="Caladea"/>
+              </a:rPr>
+              <a:t>)</a:t>
+            </a:r>
+          </a:p>
+          <a:p>
+            <a:pPr marL="0" marR="0" lvl="0" indent="0" algn="just">
+              <a:lnSpc>
+                <a:spcPct val="150000"/>
+              </a:lnSpc>
+              <a:spcBef>
+                <a:spcPts val="0"/>
+              </a:spcBef>
+              <a:spcAft>
+                <a:spcPts val="0"/>
+              </a:spcAft>
+              <a:buNone/>
+            </a:pPr>
+            <a:r>
+              <a:rPr lang="en-IN" sz="2000" dirty="0">
+                <a:solidFill>
+                  <a:srgbClr val="000000"/>
+                </a:solidFill>
+                <a:effectLst/>
+                <a:latin typeface="Times New Roman" panose="02020603050405020304" pitchFamily="18" charset="0"/>
+                <a:ea typeface="Caladea"/>
+                <a:cs typeface="Caladea"/>
+              </a:rPr>
+              <a:t>FD: ID-&gt; {Order Master [FK], item [FK], Qty, variant [FK], </a:t>
+            </a:r>
+            <a:r>
+              <a:rPr lang="en-IN" sz="2000" dirty="0" err="1">
+                <a:solidFill>
+                  <a:srgbClr val="000000"/>
+                </a:solidFill>
+                <a:effectLst/>
+                <a:latin typeface="Times New Roman" panose="02020603050405020304" pitchFamily="18" charset="0"/>
+                <a:ea typeface="Caladea"/>
+                <a:cs typeface="Caladea"/>
+              </a:rPr>
+              <a:t>addedon</a:t>
+            </a:r>
+            <a:r>
+              <a:rPr lang="en-IN" sz="2000" dirty="0">
+                <a:solidFill>
+                  <a:srgbClr val="000000"/>
+                </a:solidFill>
+                <a:effectLst/>
+                <a:latin typeface="Times New Roman" panose="02020603050405020304" pitchFamily="18" charset="0"/>
+                <a:ea typeface="Caladea"/>
+                <a:cs typeface="Caladea"/>
+              </a:rPr>
+              <a:t> [FK], </a:t>
+            </a:r>
+            <a:r>
+              <a:rPr lang="en-IN" sz="2000" dirty="0" err="1">
+                <a:solidFill>
+                  <a:srgbClr val="000000"/>
+                </a:solidFill>
+                <a:effectLst/>
+                <a:latin typeface="Times New Roman" panose="02020603050405020304" pitchFamily="18" charset="0"/>
+                <a:ea typeface="Caladea"/>
+                <a:cs typeface="Caladea"/>
+              </a:rPr>
+              <a:t>addextra</a:t>
+            </a:r>
+            <a:r>
+              <a:rPr lang="en-IN" sz="2000" dirty="0">
+                <a:solidFill>
+                  <a:srgbClr val="000000"/>
+                </a:solidFill>
+                <a:effectLst/>
+                <a:latin typeface="Times New Roman" panose="02020603050405020304" pitchFamily="18" charset="0"/>
+                <a:ea typeface="Caladea"/>
+                <a:cs typeface="Caladea"/>
+              </a:rPr>
+              <a:t> [FK], </a:t>
+            </a:r>
+            <a:r>
+              <a:rPr lang="en-IN" sz="2000" dirty="0" err="1">
+                <a:solidFill>
+                  <a:srgbClr val="000000"/>
+                </a:solidFill>
+                <a:effectLst/>
+                <a:latin typeface="Times New Roman" panose="02020603050405020304" pitchFamily="18" charset="0"/>
+                <a:ea typeface="Caladea"/>
+                <a:cs typeface="Caladea"/>
+              </a:rPr>
+              <a:t>createdAt</a:t>
+            </a:r>
+            <a:r>
+              <a:rPr lang="en-IN" sz="2000" dirty="0">
+                <a:solidFill>
+                  <a:srgbClr val="000000"/>
+                </a:solidFill>
+                <a:effectLst/>
+                <a:latin typeface="Times New Roman" panose="02020603050405020304" pitchFamily="18" charset="0"/>
+                <a:ea typeface="Caladea"/>
+                <a:cs typeface="Caladea"/>
+              </a:rPr>
+              <a:t>, </a:t>
+            </a:r>
+            <a:r>
+              <a:rPr lang="en-IN" sz="2000" dirty="0" err="1">
+                <a:solidFill>
+                  <a:srgbClr val="000000"/>
+                </a:solidFill>
+                <a:effectLst/>
+                <a:latin typeface="Times New Roman" panose="02020603050405020304" pitchFamily="18" charset="0"/>
+                <a:ea typeface="Caladea"/>
+                <a:cs typeface="Caladea"/>
+              </a:rPr>
+              <a:t>updatedAt</a:t>
+            </a:r>
+            <a:r>
+              <a:rPr lang="en-IN" sz="2000" dirty="0">
                 <a:solidFill>
                   <a:srgbClr val="000000"/>
                 </a:solidFill>
@@ -8762,7 +9016,7 @@
                 <a:ea typeface="Caladea"/>
                 <a:cs typeface="Caladea"/>
               </a:rPr>
-              <a:t>Setting Table (For Partner)</a:t>
+              <a:t>Get Touch Table</a:t>
             </a:r>
           </a:p>
           <a:p>
@@ -8779,19 +9033,31 @@
               <a:buNone/>
             </a:pPr>
             <a:r>
-              <a:rPr lang="en-IN" sz="2000" dirty="0">
-                <a:solidFill>
-                  <a:srgbClr val="000000"/>
-                </a:solidFill>
-                <a:effectLst/>
-                <a:latin typeface="Times New Roman" panose="02020603050405020304" pitchFamily="18" charset="0"/>
-                <a:ea typeface="Caladea"/>
-                <a:cs typeface="Caladea"/>
-              </a:rPr>
-              <a:t>setting (ID [PK], Cart Min Price, Cart Min Price Message, Delivery charge, GST, </a:t>
-            </a:r>
-            <a:r>
-              <a:rPr lang="en-IN" sz="2000" dirty="0" err="1">
+              <a:rPr lang="en-US" sz="2000" dirty="0" err="1">
+                <a:solidFill>
+                  <a:srgbClr val="000000"/>
+                </a:solidFill>
+                <a:effectLst/>
+                <a:latin typeface="Times New Roman" panose="02020603050405020304" pitchFamily="18" charset="0"/>
+                <a:ea typeface="Caladea"/>
+                <a:cs typeface="Caladea"/>
+              </a:rPr>
+              <a:t>gettouch</a:t>
+            </a:r>
+            <a:r>
+              <a:rPr lang="en-US" sz="2000" dirty="0">
+                <a:solidFill>
+                  <a:srgbClr val="000000"/>
+                </a:solidFill>
+                <a:effectLst/>
+                <a:latin typeface="Times New Roman" panose="02020603050405020304" pitchFamily="18" charset="0"/>
+                <a:ea typeface="Caladea"/>
+                <a:cs typeface="Caladea"/>
+              </a:rPr>
+              <a:t> (ID [PK], restaurant [FK], Subject, Message, Status, </a:t>
+            </a:r>
+            <a:r>
+              <a:rPr lang="en-US" sz="2000" dirty="0" err="1">
                 <a:solidFill>
                   <a:srgbClr val="000000"/>
                 </a:solidFill>
@@ -8803,7 +9069,7 @@
               <a:t>createdAt</a:t>
             </a:r>
             <a:r>
-              <a:rPr lang="en-IN" sz="2000" dirty="0">
+              <a:rPr lang="en-US" sz="2000" dirty="0">
                 <a:solidFill>
                   <a:srgbClr val="000000"/>
                 </a:solidFill>
@@ -8815,7 +9081,7 @@
               <a:t>, </a:t>
             </a:r>
             <a:r>
-              <a:rPr lang="en-IN" sz="2000" dirty="0" err="1">
+              <a:rPr lang="en-US" sz="2000" dirty="0" err="1">
                 <a:solidFill>
                   <a:srgbClr val="000000"/>
                 </a:solidFill>
@@ -8827,7 +9093,7 @@
               <a:t>updatedAt</a:t>
             </a:r>
             <a:r>
-              <a:rPr lang="en-IN" sz="2000" dirty="0">
+              <a:rPr lang="en-US" sz="2000" dirty="0">
                 <a:solidFill>
                   <a:srgbClr val="000000"/>
                 </a:solidFill>
@@ -8838,6 +9104,15 @@
               </a:rPr>
               <a:t>)</a:t>
             </a:r>
+            <a:endParaRPr lang="en-IN" sz="2000" dirty="0">
+              <a:solidFill>
+                <a:srgbClr val="000000"/>
+              </a:solidFill>
+              <a:effectLst/>
+              <a:latin typeface="Times New Roman" panose="02020603050405020304" pitchFamily="18" charset="0"/>
+              <a:ea typeface="Caladea"/>
+              <a:cs typeface="Caladea"/>
+            </a:endParaRPr>
           </a:p>
           <a:p>
             <a:pPr marL="0" marR="0" lvl="0" indent="0" algn="just">
@@ -8853,19 +9128,19 @@
               <a:buNone/>
             </a:pPr>
             <a:r>
-              <a:rPr lang="en-IN" sz="2000" dirty="0">
-                <a:solidFill>
-                  <a:srgbClr val="000000"/>
-                </a:solidFill>
-                <a:effectLst/>
-                <a:latin typeface="Times New Roman" panose="02020603050405020304" pitchFamily="18" charset="0"/>
-                <a:ea typeface="Caladea"/>
-                <a:cs typeface="Caladea"/>
-              </a:rPr>
-              <a:t>FD: ID-&gt; {Cart Min Price, Cart Min Price Message, Delivery charge, GST, </a:t>
-            </a:r>
-            <a:r>
-              <a:rPr lang="en-IN" sz="2000" dirty="0" err="1">
+              <a:rPr lang="en-US" sz="2000" dirty="0">
+                <a:solidFill>
+                  <a:srgbClr val="000000"/>
+                </a:solidFill>
+                <a:effectLst/>
+                <a:latin typeface="Times New Roman" panose="02020603050405020304" pitchFamily="18" charset="0"/>
+                <a:ea typeface="Caladea"/>
+                <a:cs typeface="Caladea"/>
+              </a:rPr>
+              <a:t>FD: ID-&gt; {restaurant [FK], Subject, Message, Status, </a:t>
+            </a:r>
+            <a:r>
+              <a:rPr lang="en-US" sz="2000" dirty="0" err="1">
                 <a:solidFill>
                   <a:srgbClr val="000000"/>
                 </a:solidFill>
@@ -8877,7 +9152,7 @@
               <a:t>createdAt</a:t>
             </a:r>
             <a:r>
-              <a:rPr lang="en-IN" sz="2000" dirty="0">
+              <a:rPr lang="en-US" sz="2000" dirty="0">
                 <a:solidFill>
                   <a:srgbClr val="000000"/>
                 </a:solidFill>
@@ -8889,7 +9164,7 @@
               <a:t>, </a:t>
             </a:r>
             <a:r>
-              <a:rPr lang="en-IN" sz="2000" dirty="0" err="1">
+              <a:rPr lang="en-US" sz="2000" dirty="0" err="1">
                 <a:solidFill>
                   <a:srgbClr val="000000"/>
                 </a:solidFill>
@@ -8901,7 +9176,7 @@
               <a:t>updatedAt</a:t>
             </a:r>
             <a:r>
-              <a:rPr lang="en-IN" sz="2000" dirty="0">
+              <a:rPr lang="en-US" sz="2000" dirty="0">
                 <a:solidFill>
                   <a:srgbClr val="000000"/>
                 </a:solidFill>
@@ -8914,7 +9189,7 @@
             </a:r>
           </a:p>
           <a:p>
-            <a:pPr marL="457200" marR="0" lvl="0" indent="-457200" algn="just">
+            <a:pPr marL="0" marR="0" lvl="0" indent="0" algn="just">
               <a:lnSpc>
                 <a:spcPct val="150000"/>
               </a:lnSpc>
@@ -8924,183 +9199,7 @@
               <a:spcAft>
                 <a:spcPts val="0"/>
               </a:spcAft>
-              <a:buFont typeface="+mj-lt"/>
-              <a:buAutoNum type="arabicPeriod" startAt="21"/>
-            </a:pPr>
-            <a:r>
-              <a:rPr lang="en-IN" sz="2000" dirty="0">
-                <a:solidFill>
-                  <a:srgbClr val="000000"/>
-                </a:solidFill>
-                <a:effectLst/>
-                <a:latin typeface="Times New Roman" panose="02020603050405020304" pitchFamily="18" charset="0"/>
-                <a:ea typeface="Caladea"/>
-                <a:cs typeface="Caladea"/>
-              </a:rPr>
-              <a:t>Question Table</a:t>
-            </a:r>
-          </a:p>
-          <a:p>
-            <a:pPr marL="0" marR="0" lvl="0" indent="0" algn="just">
-              <a:lnSpc>
-                <a:spcPct val="150000"/>
-              </a:lnSpc>
-              <a:spcBef>
-                <a:spcPts val="0"/>
-              </a:spcBef>
-              <a:spcAft>
-                <a:spcPts val="0"/>
-              </a:spcAft>
               <a:buNone/>
-            </a:pPr>
-            <a:r>
-              <a:rPr lang="en-IN" sz="2000" dirty="0">
-                <a:solidFill>
-                  <a:srgbClr val="000000"/>
-                </a:solidFill>
-                <a:effectLst/>
-                <a:latin typeface="Times New Roman" panose="02020603050405020304" pitchFamily="18" charset="0"/>
-                <a:ea typeface="Caladea"/>
-                <a:cs typeface="Caladea"/>
-              </a:rPr>
-              <a:t>Question (ID[PK], Question, </a:t>
-            </a:r>
-            <a:r>
-              <a:rPr lang="en-IN" sz="2000" dirty="0" err="1">
-                <a:solidFill>
-                  <a:srgbClr val="000000"/>
-                </a:solidFill>
-                <a:effectLst/>
-                <a:latin typeface="Times New Roman" panose="02020603050405020304" pitchFamily="18" charset="0"/>
-                <a:ea typeface="Caladea"/>
-                <a:cs typeface="Caladea"/>
-              </a:rPr>
-              <a:t>createdAt</a:t>
-            </a:r>
-            <a:r>
-              <a:rPr lang="en-IN" sz="2000" dirty="0">
-                <a:solidFill>
-                  <a:srgbClr val="000000"/>
-                </a:solidFill>
-                <a:effectLst/>
-                <a:latin typeface="Times New Roman" panose="02020603050405020304" pitchFamily="18" charset="0"/>
-                <a:ea typeface="Caladea"/>
-                <a:cs typeface="Caladea"/>
-              </a:rPr>
-              <a:t>, </a:t>
-            </a:r>
-            <a:r>
-              <a:rPr lang="en-IN" sz="2000" dirty="0" err="1">
-                <a:solidFill>
-                  <a:srgbClr val="000000"/>
-                </a:solidFill>
-                <a:effectLst/>
-                <a:latin typeface="Times New Roman" panose="02020603050405020304" pitchFamily="18" charset="0"/>
-                <a:ea typeface="Caladea"/>
-                <a:cs typeface="Caladea"/>
-              </a:rPr>
-              <a:t>updatedAt</a:t>
-            </a:r>
-            <a:r>
-              <a:rPr lang="en-IN" sz="2000" dirty="0">
-                <a:solidFill>
-                  <a:srgbClr val="000000"/>
-                </a:solidFill>
-                <a:effectLst/>
-                <a:latin typeface="Times New Roman" panose="02020603050405020304" pitchFamily="18" charset="0"/>
-                <a:ea typeface="Caladea"/>
-                <a:cs typeface="Caladea"/>
-              </a:rPr>
-              <a:t>)</a:t>
-            </a:r>
-          </a:p>
-          <a:p>
-            <a:pPr marL="0" marR="0" lvl="0" indent="0" algn="just">
-              <a:lnSpc>
-                <a:spcPct val="150000"/>
-              </a:lnSpc>
-              <a:spcBef>
-                <a:spcPts val="0"/>
-              </a:spcBef>
-              <a:spcAft>
-                <a:spcPts val="0"/>
-              </a:spcAft>
-              <a:buNone/>
-            </a:pPr>
-            <a:r>
-              <a:rPr lang="en-IN" sz="2000" dirty="0">
-                <a:solidFill>
-                  <a:srgbClr val="000000"/>
-                </a:solidFill>
-                <a:effectLst/>
-                <a:latin typeface="Times New Roman" panose="02020603050405020304" pitchFamily="18" charset="0"/>
-                <a:ea typeface="Caladea"/>
-                <a:cs typeface="Caladea"/>
-              </a:rPr>
-              <a:t>FD: ID-&gt; {question, </a:t>
-            </a:r>
-            <a:r>
-              <a:rPr lang="en-IN" sz="2000" dirty="0" err="1">
-                <a:solidFill>
-                  <a:srgbClr val="000000"/>
-                </a:solidFill>
-                <a:effectLst/>
-                <a:latin typeface="Times New Roman" panose="02020603050405020304" pitchFamily="18" charset="0"/>
-                <a:ea typeface="Caladea"/>
-                <a:cs typeface="Caladea"/>
-              </a:rPr>
-              <a:t>createdAt</a:t>
-            </a:r>
-            <a:r>
-              <a:rPr lang="en-IN" sz="2000" dirty="0">
-                <a:solidFill>
-                  <a:srgbClr val="000000"/>
-                </a:solidFill>
-                <a:effectLst/>
-                <a:latin typeface="Times New Roman" panose="02020603050405020304" pitchFamily="18" charset="0"/>
-                <a:ea typeface="Caladea"/>
-                <a:cs typeface="Caladea"/>
-              </a:rPr>
-              <a:t>, </a:t>
-            </a:r>
-            <a:r>
-              <a:rPr lang="en-IN" sz="2000" dirty="0" err="1">
-                <a:solidFill>
-                  <a:srgbClr val="000000"/>
-                </a:solidFill>
-                <a:effectLst/>
-                <a:latin typeface="Times New Roman" panose="02020603050405020304" pitchFamily="18" charset="0"/>
-                <a:ea typeface="Caladea"/>
-                <a:cs typeface="Caladea"/>
-              </a:rPr>
-              <a:t>updatedAt</a:t>
-            </a:r>
-            <a:r>
-              <a:rPr lang="en-IN" sz="2000" dirty="0">
-                <a:solidFill>
-                  <a:srgbClr val="000000"/>
-                </a:solidFill>
-                <a:effectLst/>
-                <a:latin typeface="Times New Roman" panose="02020603050405020304" pitchFamily="18" charset="0"/>
-                <a:ea typeface="Caladea"/>
-                <a:cs typeface="Caladea"/>
-              </a:rPr>
-              <a:t>}</a:t>
-            </a:r>
-          </a:p>
-          <a:p>
-            <a:pPr marL="457200" marR="0" lvl="0" indent="-457200" algn="just">
-              <a:lnSpc>
-                <a:spcPct val="150000"/>
-              </a:lnSpc>
-              <a:spcBef>
-                <a:spcPts val="0"/>
-              </a:spcBef>
-              <a:spcAft>
-                <a:spcPts val="0"/>
-              </a:spcAft>
-              <a:buFont typeface="+mj-lt"/>
-              <a:buAutoNum type="arabicPeriod" startAt="21"/>
             </a:pPr>
             <a:endParaRPr lang="en-IN" sz="2000" dirty="0">
               <a:solidFill>
@@ -9117,7 +9216,7 @@
     </p:spTree>
     <p:extLst>
       <p:ext uri="{BB962C8B-B14F-4D97-AF65-F5344CB8AC3E}">
-        <p14:creationId xmlns:p14="http://schemas.microsoft.com/office/powerpoint/2010/main" val="3380468191"/>
+        <p14:creationId xmlns:p14="http://schemas.microsoft.com/office/powerpoint/2010/main" val="239883681"/>
       </p:ext>
     </p:extLst>
   </p:cSld>
@@ -9222,7 +9321,7 @@
                 <a:spcPts val="0"/>
               </a:spcAft>
               <a:buFont typeface="+mj-lt"/>
-              <a:buAutoNum type="arabicPeriod" startAt="22"/>
+              <a:buAutoNum type="arabicPeriod" startAt="21"/>
             </a:pPr>
             <a:r>
               <a:rPr lang="en-IN" sz="2000" dirty="0">
@@ -9234,7 +9333,7 @@
                 <a:ea typeface="Caladea"/>
                 <a:cs typeface="Caladea"/>
               </a:rPr>
-              <a:t>Complain Table</a:t>
+              <a:t>Setting Table (For Partner)</a:t>
             </a:r>
           </a:p>
           <a:p>
@@ -9260,7 +9359,7 @@
                 <a:ea typeface="Caladea"/>
                 <a:cs typeface="Caladea"/>
               </a:rPr>
-              <a:t>complain (ID[PK], customer [FK], order [FK], question [FK], Message, Status, </a:t>
+              <a:t>setting (ID [PK], restaurant [FK], Cart Min Price, Cart Min Price Message, Delivery charge, GST, </a:t>
             </a:r>
             <a:r>
               <a:rPr lang="en-IN" sz="2000" dirty="0" err="1">
@@ -9308,7 +9407,7 @@
                 <a:ea typeface="Caladea"/>
                 <a:cs typeface="Caladea"/>
               </a:rPr>
-              <a:t>,)</a:t>
+              <a:t>)</a:t>
             </a:r>
           </a:p>
           <a:p>
@@ -9334,7 +9433,7 @@
                 <a:ea typeface="Caladea"/>
                 <a:cs typeface="Caladea"/>
               </a:rPr>
-              <a:t>FD: ID-&gt; {customer [FK], order [FK], question [FK], Message, Status, </a:t>
+              <a:t>FD: ID-&gt; {restaurant [FK], Cart Min Price, Cart Min Price Message, Delivery charge, GST, </a:t>
             </a:r>
             <a:r>
               <a:rPr lang="en-IN" sz="2000" dirty="0" err="1">
@@ -9397,19 +9496,19 @@
                 <a:spcPts val="0"/>
               </a:spcAft>
               <a:buFont typeface="+mj-lt"/>
-              <a:buAutoNum type="arabicPeriod" startAt="23"/>
+              <a:buAutoNum type="arabicPeriod" startAt="22"/>
             </a:pPr>
             <a:r>
-              <a:rPr lang="en-US" sz="2000" dirty="0">
-                <a:solidFill>
-                  <a:srgbClr val="000000"/>
-                </a:solidFill>
-                <a:effectLst/>
-                <a:latin typeface="Times New Roman" panose="02020603050405020304" pitchFamily="18" charset="0"/>
-                <a:ea typeface="Caladea"/>
-                <a:cs typeface="Caladea"/>
-              </a:rPr>
-              <a:t>Referral Amount Table</a:t>
+              <a:rPr lang="en-IN" sz="2000" dirty="0">
+                <a:solidFill>
+                  <a:srgbClr val="000000"/>
+                </a:solidFill>
+                <a:effectLst/>
+                <a:latin typeface="Times New Roman" panose="02020603050405020304" pitchFamily="18" charset="0"/>
+                <a:ea typeface="Caladea"/>
+                <a:cs typeface="Caladea"/>
+              </a:rPr>
+              <a:t>Question Table</a:t>
             </a:r>
           </a:p>
           <a:p>
@@ -9426,19 +9525,19 @@
               <a:buNone/>
             </a:pPr>
             <a:r>
-              <a:rPr lang="en-US" sz="2000" dirty="0">
-                <a:solidFill>
-                  <a:srgbClr val="000000"/>
-                </a:solidFill>
-                <a:effectLst/>
-                <a:latin typeface="Times New Roman" panose="02020603050405020304" pitchFamily="18" charset="0"/>
-                <a:ea typeface="Caladea"/>
-                <a:cs typeface="Caladea"/>
-              </a:rPr>
-              <a:t>referral (ID[PK], Referral Amount, </a:t>
-            </a:r>
-            <a:r>
-              <a:rPr lang="en-US" sz="2000" dirty="0" err="1">
+              <a:rPr lang="en-IN" sz="2000" dirty="0">
+                <a:solidFill>
+                  <a:srgbClr val="000000"/>
+                </a:solidFill>
+                <a:effectLst/>
+                <a:latin typeface="Times New Roman" panose="02020603050405020304" pitchFamily="18" charset="0"/>
+                <a:ea typeface="Caladea"/>
+                <a:cs typeface="Caladea"/>
+              </a:rPr>
+              <a:t>Question (ID[PK], Question, </a:t>
+            </a:r>
+            <a:r>
+              <a:rPr lang="en-IN" sz="2000" dirty="0" err="1">
                 <a:solidFill>
                   <a:srgbClr val="000000"/>
                 </a:solidFill>
@@ -9450,7 +9549,7 @@
               <a:t>createdAt</a:t>
             </a:r>
             <a:r>
-              <a:rPr lang="en-US" sz="2000" dirty="0">
+              <a:rPr lang="en-IN" sz="2000" dirty="0">
                 <a:solidFill>
                   <a:srgbClr val="000000"/>
                 </a:solidFill>
@@ -9462,7 +9561,7 @@
               <a:t>, </a:t>
             </a:r>
             <a:r>
-              <a:rPr lang="en-US" sz="2000" dirty="0" err="1">
+              <a:rPr lang="en-IN" sz="2000" dirty="0" err="1">
                 <a:solidFill>
                   <a:srgbClr val="000000"/>
                 </a:solidFill>
@@ -9474,16 +9573,16 @@
               <a:t>updatedAt</a:t>
             </a:r>
             <a:r>
-              <a:rPr lang="en-US" sz="2000" dirty="0">
-                <a:solidFill>
-                  <a:srgbClr val="000000"/>
-                </a:solidFill>
-                <a:effectLst/>
-                <a:latin typeface="Times New Roman" panose="02020603050405020304" pitchFamily="18" charset="0"/>
-                <a:ea typeface="Caladea"/>
-                <a:cs typeface="Caladea"/>
-              </a:rPr>
-              <a:t>) </a:t>
+              <a:rPr lang="en-IN" sz="2000" dirty="0">
+                <a:solidFill>
+                  <a:srgbClr val="000000"/>
+                </a:solidFill>
+                <a:effectLst/>
+                <a:latin typeface="Times New Roman" panose="02020603050405020304" pitchFamily="18" charset="0"/>
+                <a:ea typeface="Caladea"/>
+                <a:cs typeface="Caladea"/>
+              </a:rPr>
+              <a:t>)</a:t>
             </a:r>
           </a:p>
           <a:p>
@@ -9500,19 +9599,19 @@
               <a:buNone/>
             </a:pPr>
             <a:r>
-              <a:rPr lang="en-US" sz="2000" dirty="0">
-                <a:solidFill>
-                  <a:srgbClr val="000000"/>
-                </a:solidFill>
-                <a:effectLst/>
-                <a:latin typeface="Times New Roman" panose="02020603050405020304" pitchFamily="18" charset="0"/>
-                <a:ea typeface="Caladea"/>
-                <a:cs typeface="Caladea"/>
-              </a:rPr>
-              <a:t>FD: ID-&gt; {Referral Amount, </a:t>
-            </a:r>
-            <a:r>
-              <a:rPr lang="en-US" sz="2000" dirty="0" err="1">
+              <a:rPr lang="en-IN" sz="2000" dirty="0">
+                <a:solidFill>
+                  <a:srgbClr val="000000"/>
+                </a:solidFill>
+                <a:effectLst/>
+                <a:latin typeface="Times New Roman" panose="02020603050405020304" pitchFamily="18" charset="0"/>
+                <a:ea typeface="Caladea"/>
+                <a:cs typeface="Caladea"/>
+              </a:rPr>
+              <a:t>FD: ID-&gt; {question, </a:t>
+            </a:r>
+            <a:r>
+              <a:rPr lang="en-IN" sz="2000" dirty="0" err="1">
                 <a:solidFill>
                   <a:srgbClr val="000000"/>
                 </a:solidFill>
@@ -9524,7 +9623,7 @@
               <a:t>createdAt</a:t>
             </a:r>
             <a:r>
-              <a:rPr lang="en-US" sz="2000" dirty="0">
+              <a:rPr lang="en-IN" sz="2000" dirty="0">
                 <a:solidFill>
                   <a:srgbClr val="000000"/>
                 </a:solidFill>
@@ -9536,7 +9635,7 @@
               <a:t>, </a:t>
             </a:r>
             <a:r>
-              <a:rPr lang="en-US" sz="2000" dirty="0" err="1">
+              <a:rPr lang="en-IN" sz="2000" dirty="0" err="1">
                 <a:solidFill>
                   <a:srgbClr val="000000"/>
                 </a:solidFill>
@@ -9548,16 +9647,16 @@
               <a:t>updatedAt</a:t>
             </a:r>
             <a:r>
-              <a:rPr lang="en-US" sz="2000" dirty="0">
-                <a:solidFill>
-                  <a:srgbClr val="000000"/>
-                </a:solidFill>
-                <a:effectLst/>
-                <a:latin typeface="Times New Roman" panose="02020603050405020304" pitchFamily="18" charset="0"/>
-                <a:ea typeface="Caladea"/>
-                <a:cs typeface="Caladea"/>
-              </a:rPr>
-              <a:t>)</a:t>
+              <a:rPr lang="en-IN" sz="2000" dirty="0">
+                <a:solidFill>
+                  <a:srgbClr val="000000"/>
+                </a:solidFill>
+                <a:effectLst/>
+                <a:latin typeface="Times New Roman" panose="02020603050405020304" pitchFamily="18" charset="0"/>
+                <a:ea typeface="Caladea"/>
+                <a:cs typeface="Caladea"/>
+              </a:rPr>
+              <a:t>}</a:t>
             </a:r>
           </a:p>
           <a:p>
@@ -9572,7 +9671,7 @@
                 <a:spcPts val="0"/>
               </a:spcAft>
               <a:buFont typeface="+mj-lt"/>
-              <a:buAutoNum type="arabicPeriod" startAt="23"/>
+              <a:buAutoNum type="arabicPeriod" startAt="21"/>
             </a:pPr>
             <a:endParaRPr lang="en-IN" sz="2000" dirty="0">
               <a:solidFill>
@@ -9589,7 +9688,7 @@
     </p:spTree>
     <p:extLst>
       <p:ext uri="{BB962C8B-B14F-4D97-AF65-F5344CB8AC3E}">
-        <p14:creationId xmlns:p14="http://schemas.microsoft.com/office/powerpoint/2010/main" val="2525193661"/>
+        <p14:creationId xmlns:p14="http://schemas.microsoft.com/office/powerpoint/2010/main" val="3380468191"/>
       </p:ext>
     </p:extLst>
   </p:cSld>
@@ -9694,7 +9793,7 @@
                 <a:spcPts val="0"/>
               </a:spcAft>
               <a:buFont typeface="+mj-lt"/>
-              <a:buAutoNum type="arabicPeriod" startAt="24"/>
+              <a:buAutoNum type="arabicPeriod" startAt="23"/>
             </a:pPr>
             <a:r>
               <a:rPr lang="en-IN" sz="2000" dirty="0">
@@ -9706,7 +9805,7 @@
                 <a:ea typeface="Caladea"/>
                 <a:cs typeface="Caladea"/>
               </a:rPr>
-              <a:t>Review Table</a:t>
+              <a:t>Complain Table</a:t>
             </a:r>
           </a:p>
           <a:p>
@@ -9732,7 +9831,7 @@
                 <a:ea typeface="Caladea"/>
                 <a:cs typeface="Caladea"/>
               </a:rPr>
-              <a:t>review (ID[PK], customer [FK], order [FK], item [FK], ratting, comment, </a:t>
+              <a:t>complain (ID[PK], customer [FK], order [FK], question [FK], Message, Status, </a:t>
             </a:r>
             <a:r>
               <a:rPr lang="en-IN" sz="2000" dirty="0" err="1">
@@ -9780,7 +9879,7 @@
                 <a:ea typeface="Caladea"/>
                 <a:cs typeface="Caladea"/>
               </a:rPr>
-              <a:t>)</a:t>
+              <a:t>,)</a:t>
             </a:r>
           </a:p>
           <a:p>
@@ -9806,7 +9905,7 @@
                 <a:ea typeface="Caladea"/>
                 <a:cs typeface="Caladea"/>
               </a:rPr>
-              <a:t>FD: ID-&gt; {customer [FK], order [FK], item [FK], ratting, comment, </a:t>
+              <a:t>FD: ID-&gt; {customer [FK], order [FK], question [FK], Message, Status, </a:t>
             </a:r>
             <a:r>
               <a:rPr lang="en-IN" sz="2000" dirty="0" err="1">
@@ -9857,6 +9956,303 @@
               <a:t>}</a:t>
             </a:r>
           </a:p>
+          <a:p>
+            <a:pPr marL="457200" marR="0" lvl="0" indent="-457200" algn="just">
+              <a:lnSpc>
+                <a:spcPct val="150000"/>
+              </a:lnSpc>
+              <a:spcBef>
+                <a:spcPts val="0"/>
+              </a:spcBef>
+              <a:spcAft>
+                <a:spcPts val="0"/>
+              </a:spcAft>
+              <a:buFont typeface="+mj-lt"/>
+              <a:buAutoNum type="arabicPeriod" startAt="24"/>
+            </a:pPr>
+            <a:r>
+              <a:rPr lang="en-US" sz="2000" dirty="0">
+                <a:solidFill>
+                  <a:srgbClr val="000000"/>
+                </a:solidFill>
+                <a:effectLst/>
+                <a:latin typeface="Times New Roman" panose="02020603050405020304" pitchFamily="18" charset="0"/>
+                <a:ea typeface="Caladea"/>
+                <a:cs typeface="Caladea"/>
+              </a:rPr>
+              <a:t>Referral Amount Table</a:t>
+            </a:r>
+          </a:p>
+          <a:p>
+            <a:pPr marL="0" marR="0" lvl="0" indent="0" algn="just">
+              <a:lnSpc>
+                <a:spcPct val="150000"/>
+              </a:lnSpc>
+              <a:spcBef>
+                <a:spcPts val="0"/>
+              </a:spcBef>
+              <a:spcAft>
+                <a:spcPts val="0"/>
+              </a:spcAft>
+              <a:buNone/>
+            </a:pPr>
+            <a:r>
+              <a:rPr lang="en-US" sz="2000" dirty="0">
+                <a:solidFill>
+                  <a:srgbClr val="000000"/>
+                </a:solidFill>
+                <a:effectLst/>
+                <a:latin typeface="Times New Roman" panose="02020603050405020304" pitchFamily="18" charset="0"/>
+                <a:ea typeface="Caladea"/>
+                <a:cs typeface="Caladea"/>
+              </a:rPr>
+              <a:t>referral (ID[PK], Referral Amount, </a:t>
+            </a:r>
+            <a:r>
+              <a:rPr lang="en-US" sz="2000" dirty="0" err="1">
+                <a:solidFill>
+                  <a:srgbClr val="000000"/>
+                </a:solidFill>
+                <a:effectLst/>
+                <a:latin typeface="Times New Roman" panose="02020603050405020304" pitchFamily="18" charset="0"/>
+                <a:ea typeface="Caladea"/>
+                <a:cs typeface="Caladea"/>
+              </a:rPr>
+              <a:t>createdAt</a:t>
+            </a:r>
+            <a:r>
+              <a:rPr lang="en-US" sz="2000" dirty="0">
+                <a:solidFill>
+                  <a:srgbClr val="000000"/>
+                </a:solidFill>
+                <a:effectLst/>
+                <a:latin typeface="Times New Roman" panose="02020603050405020304" pitchFamily="18" charset="0"/>
+                <a:ea typeface="Caladea"/>
+                <a:cs typeface="Caladea"/>
+              </a:rPr>
+              <a:t>, </a:t>
+            </a:r>
+            <a:r>
+              <a:rPr lang="en-US" sz="2000" dirty="0" err="1">
+                <a:solidFill>
+                  <a:srgbClr val="000000"/>
+                </a:solidFill>
+                <a:effectLst/>
+                <a:latin typeface="Times New Roman" panose="02020603050405020304" pitchFamily="18" charset="0"/>
+                <a:ea typeface="Caladea"/>
+                <a:cs typeface="Caladea"/>
+              </a:rPr>
+              <a:t>updatedAt</a:t>
+            </a:r>
+            <a:r>
+              <a:rPr lang="en-US" sz="2000" dirty="0">
+                <a:solidFill>
+                  <a:srgbClr val="000000"/>
+                </a:solidFill>
+                <a:effectLst/>
+                <a:latin typeface="Times New Roman" panose="02020603050405020304" pitchFamily="18" charset="0"/>
+                <a:ea typeface="Caladea"/>
+                <a:cs typeface="Caladea"/>
+              </a:rPr>
+              <a:t>) </a:t>
+            </a:r>
+          </a:p>
+          <a:p>
+            <a:pPr marL="0" marR="0" lvl="0" indent="0" algn="just">
+              <a:lnSpc>
+                <a:spcPct val="150000"/>
+              </a:lnSpc>
+              <a:spcBef>
+                <a:spcPts val="0"/>
+              </a:spcBef>
+              <a:spcAft>
+                <a:spcPts val="0"/>
+              </a:spcAft>
+              <a:buNone/>
+            </a:pPr>
+            <a:r>
+              <a:rPr lang="en-US" sz="2000" dirty="0">
+                <a:solidFill>
+                  <a:srgbClr val="000000"/>
+                </a:solidFill>
+                <a:effectLst/>
+                <a:latin typeface="Times New Roman" panose="02020603050405020304" pitchFamily="18" charset="0"/>
+                <a:ea typeface="Caladea"/>
+                <a:cs typeface="Caladea"/>
+              </a:rPr>
+              <a:t>FD: ID-&gt; {Referral Amount, </a:t>
+            </a:r>
+            <a:r>
+              <a:rPr lang="en-US" sz="2000" dirty="0" err="1">
+                <a:solidFill>
+                  <a:srgbClr val="000000"/>
+                </a:solidFill>
+                <a:effectLst/>
+                <a:latin typeface="Times New Roman" panose="02020603050405020304" pitchFamily="18" charset="0"/>
+                <a:ea typeface="Caladea"/>
+                <a:cs typeface="Caladea"/>
+              </a:rPr>
+              <a:t>createdAt</a:t>
+            </a:r>
+            <a:r>
+              <a:rPr lang="en-US" sz="2000" dirty="0">
+                <a:solidFill>
+                  <a:srgbClr val="000000"/>
+                </a:solidFill>
+                <a:effectLst/>
+                <a:latin typeface="Times New Roman" panose="02020603050405020304" pitchFamily="18" charset="0"/>
+                <a:ea typeface="Caladea"/>
+                <a:cs typeface="Caladea"/>
+              </a:rPr>
+              <a:t>, </a:t>
+            </a:r>
+            <a:r>
+              <a:rPr lang="en-US" sz="2000" dirty="0" err="1">
+                <a:solidFill>
+                  <a:srgbClr val="000000"/>
+                </a:solidFill>
+                <a:effectLst/>
+                <a:latin typeface="Times New Roman" panose="02020603050405020304" pitchFamily="18" charset="0"/>
+                <a:ea typeface="Caladea"/>
+                <a:cs typeface="Caladea"/>
+              </a:rPr>
+              <a:t>updatedAt</a:t>
+            </a:r>
+            <a:r>
+              <a:rPr lang="en-US" sz="2000" dirty="0">
+                <a:solidFill>
+                  <a:srgbClr val="000000"/>
+                </a:solidFill>
+                <a:effectLst/>
+                <a:latin typeface="Times New Roman" panose="02020603050405020304" pitchFamily="18" charset="0"/>
+                <a:ea typeface="Caladea"/>
+                <a:cs typeface="Caladea"/>
+              </a:rPr>
+              <a:t>)</a:t>
+            </a:r>
+          </a:p>
+          <a:p>
+            <a:pPr marL="457200" marR="0" lvl="0" indent="-457200" algn="just">
+              <a:lnSpc>
+                <a:spcPct val="150000"/>
+              </a:lnSpc>
+              <a:spcBef>
+                <a:spcPts val="0"/>
+              </a:spcBef>
+              <a:spcAft>
+                <a:spcPts val="0"/>
+              </a:spcAft>
+              <a:buFont typeface="+mj-lt"/>
+              <a:buAutoNum type="arabicPeriod" startAt="23"/>
+            </a:pPr>
+            <a:endParaRPr lang="en-IN" sz="2000" dirty="0">
+              <a:solidFill>
+                <a:srgbClr val="000000"/>
+              </a:solidFill>
+              <a:effectLst/>
+              <a:latin typeface="Times New Roman" panose="02020603050405020304" pitchFamily="18" charset="0"/>
+              <a:ea typeface="Caladea"/>
+              <a:cs typeface="Caladea"/>
+            </a:endParaRPr>
+          </a:p>
+        </p:txBody>
+      </p:sp>
+    </p:spTree>
+    <p:extLst>
+      <p:ext uri="{BB962C8B-B14F-4D97-AF65-F5344CB8AC3E}">
+        <p14:creationId xmlns:p14="http://schemas.microsoft.com/office/powerpoint/2010/main" val="2525193661"/>
+      </p:ext>
+    </p:extLst>
+  </p:cSld>
+  <p:clrMapOvr>
+    <a:masterClrMapping/>
+  </p:clrMapOvr>
+</p:sld>
+</file>
+
+<file path=ppt/slides/slide26.xml><?xml version="1.0" encoding="utf-8"?>
+<p:sld xmlns:a="http://schemas.openxmlformats.org/drawingml/2006/main" xmlns:r="http://schemas.openxmlformats.org/officeDocument/2006/relationships" xmlns:p="http://schemas.openxmlformats.org/presentationml/2006/main">
+  <p:cSld>
+    <p:spTree>
+      <p:nvGrpSpPr>
+        <p:cNvPr id="1" name=""/>
+        <p:cNvGrpSpPr/>
+        <p:nvPr/>
+      </p:nvGrpSpPr>
+      <p:grpSpPr>
+        <a:xfrm>
+          <a:off x="0" y="0"/>
+          <a:ext cx="0" cy="0"/>
+          <a:chOff x="0" y="0"/>
+          <a:chExt cx="0" cy="0"/>
+        </a:xfrm>
+      </p:grpSpPr>
+      <p:sp>
+        <p:nvSpPr>
+          <p:cNvPr id="2" name="Title 1">
+            <a:extLst>
+              <a:ext uri="{FF2B5EF4-FFF2-40B4-BE49-F238E27FC236}">
+                <a16:creationId xmlns:a16="http://schemas.microsoft.com/office/drawing/2014/main" id="{332EF34D-E2CF-466D-90B8-A05283CB611C}"/>
+              </a:ext>
+            </a:extLst>
+          </p:cNvPr>
+          <p:cNvSpPr>
+            <a:spLocks noGrp="1"/>
+          </p:cNvSpPr>
+          <p:nvPr>
+            <p:ph type="title"/>
+          </p:nvPr>
+        </p:nvSpPr>
+        <p:spPr>
+          <a:xfrm>
+            <a:off x="628650" y="365127"/>
+            <a:ext cx="7886700" cy="643542"/>
+          </a:xfrm>
+        </p:spPr>
+        <p:txBody>
+          <a:bodyPr>
+            <a:normAutofit/>
+          </a:bodyPr>
+          <a:lstStyle/>
+          <a:p>
+            <a:pPr algn="ctr"/>
+            <a:r>
+              <a:rPr lang="en-IN" sz="2800" b="1" dirty="0">
+                <a:latin typeface="Times New Roman" panose="02020603050405020304" pitchFamily="18" charset="0"/>
+                <a:cs typeface="Times New Roman" panose="02020603050405020304" pitchFamily="18" charset="0"/>
+              </a:rPr>
+              <a:t>Database Design</a:t>
+            </a:r>
+          </a:p>
+        </p:txBody>
+      </p:sp>
+      <p:sp>
+        <p:nvSpPr>
+          <p:cNvPr id="3" name="Content Placeholder 2">
+            <a:extLst>
+              <a:ext uri="{FF2B5EF4-FFF2-40B4-BE49-F238E27FC236}">
+                <a16:creationId xmlns:a16="http://schemas.microsoft.com/office/drawing/2014/main" id="{E1A2DE00-B63B-482A-8267-C160DAC309B1}"/>
+              </a:ext>
+            </a:extLst>
+          </p:cNvPr>
+          <p:cNvSpPr>
+            <a:spLocks noGrp="1"/>
+          </p:cNvSpPr>
+          <p:nvPr>
+            <p:ph idx="1"/>
+          </p:nvPr>
+        </p:nvSpPr>
+        <p:spPr>
+          <a:xfrm>
+            <a:off x="628650" y="945954"/>
+            <a:ext cx="7886700" cy="5683446"/>
+          </a:xfrm>
+        </p:spPr>
+        <p:txBody>
+          <a:bodyPr>
+            <a:noAutofit/>
+          </a:bodyPr>
+          <a:lstStyle/>
           <a:p>
             <a:pPr marL="457200" marR="0" lvl="0" indent="-457200" algn="just">
               <a:lnSpc>
@@ -9870,6 +10266,181 @@
               </a:spcAft>
               <a:buFont typeface="+mj-lt"/>
               <a:buAutoNum type="arabicPeriod" startAt="25"/>
+            </a:pPr>
+            <a:r>
+              <a:rPr lang="en-IN" sz="2000" dirty="0">
+                <a:solidFill>
+                  <a:srgbClr val="000000"/>
+                </a:solidFill>
+                <a:effectLst/>
+                <a:latin typeface="Times New Roman" panose="02020603050405020304" pitchFamily="18" charset="0"/>
+                <a:ea typeface="Caladea"/>
+                <a:cs typeface="Caladea"/>
+              </a:rPr>
+              <a:t>Review Table</a:t>
+            </a:r>
+          </a:p>
+          <a:p>
+            <a:pPr marL="0" marR="0" lvl="0" indent="0" algn="just">
+              <a:lnSpc>
+                <a:spcPct val="150000"/>
+              </a:lnSpc>
+              <a:spcBef>
+                <a:spcPts val="0"/>
+              </a:spcBef>
+              <a:spcAft>
+                <a:spcPts val="0"/>
+              </a:spcAft>
+              <a:buNone/>
+            </a:pPr>
+            <a:r>
+              <a:rPr lang="en-IN" sz="2000" dirty="0">
+                <a:solidFill>
+                  <a:srgbClr val="000000"/>
+                </a:solidFill>
+                <a:effectLst/>
+                <a:latin typeface="Times New Roman" panose="02020603050405020304" pitchFamily="18" charset="0"/>
+                <a:ea typeface="Caladea"/>
+                <a:cs typeface="Caladea"/>
+              </a:rPr>
+              <a:t>review (ID[PK], customer [FK], order [FK], item [FK], ratting, comment, </a:t>
+            </a:r>
+            <a:r>
+              <a:rPr lang="en-IN" sz="2000" dirty="0" err="1">
+                <a:solidFill>
+                  <a:srgbClr val="000000"/>
+                </a:solidFill>
+                <a:effectLst/>
+                <a:latin typeface="Times New Roman" panose="02020603050405020304" pitchFamily="18" charset="0"/>
+                <a:ea typeface="Caladea"/>
+                <a:cs typeface="Caladea"/>
+              </a:rPr>
+              <a:t>createdAt</a:t>
+            </a:r>
+            <a:r>
+              <a:rPr lang="en-IN" sz="2000" dirty="0">
+                <a:solidFill>
+                  <a:srgbClr val="000000"/>
+                </a:solidFill>
+                <a:effectLst/>
+                <a:latin typeface="Times New Roman" panose="02020603050405020304" pitchFamily="18" charset="0"/>
+                <a:ea typeface="Caladea"/>
+                <a:cs typeface="Caladea"/>
+              </a:rPr>
+              <a:t>, </a:t>
+            </a:r>
+            <a:r>
+              <a:rPr lang="en-IN" sz="2000" dirty="0" err="1">
+                <a:solidFill>
+                  <a:srgbClr val="000000"/>
+                </a:solidFill>
+                <a:effectLst/>
+                <a:latin typeface="Times New Roman" panose="02020603050405020304" pitchFamily="18" charset="0"/>
+                <a:ea typeface="Caladea"/>
+                <a:cs typeface="Caladea"/>
+              </a:rPr>
+              <a:t>updatedAt</a:t>
+            </a:r>
+            <a:r>
+              <a:rPr lang="en-IN" sz="2000" dirty="0">
+                <a:solidFill>
+                  <a:srgbClr val="000000"/>
+                </a:solidFill>
+                <a:effectLst/>
+                <a:latin typeface="Times New Roman" panose="02020603050405020304" pitchFamily="18" charset="0"/>
+                <a:ea typeface="Caladea"/>
+                <a:cs typeface="Caladea"/>
+              </a:rPr>
+              <a:t>)</a:t>
+            </a:r>
+          </a:p>
+          <a:p>
+            <a:pPr marL="0" marR="0" lvl="0" indent="0" algn="just">
+              <a:lnSpc>
+                <a:spcPct val="150000"/>
+              </a:lnSpc>
+              <a:spcBef>
+                <a:spcPts val="0"/>
+              </a:spcBef>
+              <a:spcAft>
+                <a:spcPts val="0"/>
+              </a:spcAft>
+              <a:buNone/>
+            </a:pPr>
+            <a:r>
+              <a:rPr lang="en-IN" sz="2000" dirty="0">
+                <a:solidFill>
+                  <a:srgbClr val="000000"/>
+                </a:solidFill>
+                <a:effectLst/>
+                <a:latin typeface="Times New Roman" panose="02020603050405020304" pitchFamily="18" charset="0"/>
+                <a:ea typeface="Caladea"/>
+                <a:cs typeface="Caladea"/>
+              </a:rPr>
+              <a:t>FD: ID-&gt; {customer [FK], order [FK], item [FK], ratting, comment, </a:t>
+            </a:r>
+            <a:r>
+              <a:rPr lang="en-IN" sz="2000" dirty="0" err="1">
+                <a:solidFill>
+                  <a:srgbClr val="000000"/>
+                </a:solidFill>
+                <a:effectLst/>
+                <a:latin typeface="Times New Roman" panose="02020603050405020304" pitchFamily="18" charset="0"/>
+                <a:ea typeface="Caladea"/>
+                <a:cs typeface="Caladea"/>
+              </a:rPr>
+              <a:t>createdAt</a:t>
+            </a:r>
+            <a:r>
+              <a:rPr lang="en-IN" sz="2000" dirty="0">
+                <a:solidFill>
+                  <a:srgbClr val="000000"/>
+                </a:solidFill>
+                <a:effectLst/>
+                <a:latin typeface="Times New Roman" panose="02020603050405020304" pitchFamily="18" charset="0"/>
+                <a:ea typeface="Caladea"/>
+                <a:cs typeface="Caladea"/>
+              </a:rPr>
+              <a:t>, </a:t>
+            </a:r>
+            <a:r>
+              <a:rPr lang="en-IN" sz="2000" dirty="0" err="1">
+                <a:solidFill>
+                  <a:srgbClr val="000000"/>
+                </a:solidFill>
+                <a:effectLst/>
+                <a:latin typeface="Times New Roman" panose="02020603050405020304" pitchFamily="18" charset="0"/>
+                <a:ea typeface="Caladea"/>
+                <a:cs typeface="Caladea"/>
+              </a:rPr>
+              <a:t>updatedAt</a:t>
+            </a:r>
+            <a:r>
+              <a:rPr lang="en-IN" sz="2000" dirty="0">
+                <a:solidFill>
+                  <a:srgbClr val="000000"/>
+                </a:solidFill>
+                <a:effectLst/>
+                <a:latin typeface="Times New Roman" panose="02020603050405020304" pitchFamily="18" charset="0"/>
+                <a:ea typeface="Caladea"/>
+                <a:cs typeface="Caladea"/>
+              </a:rPr>
+              <a:t>}</a:t>
+            </a:r>
+          </a:p>
+          <a:p>
+            <a:pPr marL="457200" marR="0" lvl="0" indent="-457200" algn="just">
+              <a:lnSpc>
+                <a:spcPct val="150000"/>
+              </a:lnSpc>
+              <a:spcBef>
+                <a:spcPts val="0"/>
+              </a:spcBef>
+              <a:spcAft>
+                <a:spcPts val="0"/>
+              </a:spcAft>
+              <a:buFont typeface="+mj-lt"/>
+              <a:buAutoNum type="arabicPeriod" startAt="26"/>
             </a:pPr>
             <a:r>
               <a:rPr lang="en-IN" sz="2000" dirty="0">
@@ -10095,7 +10666,7 @@
 </p:sld>
 </file>
 
-<file path=ppt/slides/slide26.xml><?xml version="1.0" encoding="utf-8"?>
+<file path=ppt/slides/slide27.xml><?xml version="1.0" encoding="utf-8"?>
 <p:sld xmlns:a="http://schemas.openxmlformats.org/drawingml/2006/main" xmlns:r="http://schemas.openxmlformats.org/officeDocument/2006/relationships" xmlns:p="http://schemas.openxmlformats.org/presentationml/2006/main">
   <p:cSld>
     <p:spTree>
@@ -10581,7 +11152,7 @@
 </p:sld>
 </file>
 
-<file path=ppt/slides/slide27.xml><?xml version="1.0" encoding="utf-8"?>
+<file path=ppt/slides/slide28.xml><?xml version="1.0" encoding="utf-8"?>
 <p:sld xmlns:a="http://schemas.openxmlformats.org/drawingml/2006/main" xmlns:r="http://schemas.openxmlformats.org/officeDocument/2006/relationships" xmlns:p="http://schemas.openxmlformats.org/presentationml/2006/main">
   <p:cSld>
     <p:spTree>

</xml_diff>